<commit_message>
Added Naive-Bayes and Perceptron classifiers
</commit_message>
<xml_diff>
--- a/slides/ro_Text_Mining_-_Document_Classification_Reuters-21578_Dataset.pptx
+++ b/slides/ro_Text_Mining_-_Document_Classification_Reuters-21578_Dataset.pptx
@@ -15,21 +15,22 @@
     <p:sldId id="260" r:id="rId10"/>
     <p:sldId id="261" r:id="rId11"/>
     <p:sldId id="262" r:id="rId12"/>
+    <p:sldId id="263" r:id="rId13"/>
   </p:sldIdLst>
   <p:sldSz cy="5143500" cx="9144000"/>
   <p:notesSz cx="6858000" cy="9144000"/>
   <p:embeddedFontLst>
     <p:embeddedFont>
       <p:font typeface="PT Sans Narrow"/>
-      <p:regular r:id="rId13"/>
-      <p:bold r:id="rId14"/>
+      <p:regular r:id="rId14"/>
+      <p:bold r:id="rId15"/>
     </p:embeddedFont>
     <p:embeddedFont>
       <p:font typeface="Open Sans"/>
-      <p:regular r:id="rId15"/>
-      <p:bold r:id="rId16"/>
-      <p:italic r:id="rId17"/>
-      <p:boldItalic r:id="rId18"/>
+      <p:regular r:id="rId16"/>
+      <p:bold r:id="rId17"/>
+      <p:italic r:id="rId18"/>
+      <p:boldItalic r:id="rId19"/>
     </p:embeddedFont>
   </p:embeddedFontLst>
   <p:defaultTextStyle>
@@ -1010,6 +1011,101 @@
       <p:sp>
         <p:nvSpPr>
           <p:cNvPr id="111" name="Shape 111"/>
+          <p:cNvSpPr txBox="1"/>
+          <p:nvPr>
+            <p:ph idx="1" type="body"/>
+          </p:nvPr>
+        </p:nvSpPr>
+        <p:spPr>
+          <a:xfrm>
+            <a:off x="685800" y="4343400"/>
+            <a:ext cx="5486400" cy="4114800"/>
+          </a:xfrm>
+          <a:prstGeom prst="rect">
+            <a:avLst/>
+          </a:prstGeom>
+        </p:spPr>
+        <p:txBody>
+          <a:bodyPr anchorCtr="0" anchor="t" bIns="91425" lIns="91425" rIns="91425" tIns="91425">
+            <a:noAutofit/>
+          </a:bodyPr>
+          <a:lstStyle/>
+          <a:p>
+            <a:pPr lvl="0">
+              <a:spcBef>
+                <a:spcPts val="0"/>
+              </a:spcBef>
+              <a:buNone/>
+            </a:pPr>
+            <a:r>
+              <a:t/>
+            </a:r>
+            <a:endParaRPr/>
+          </a:p>
+        </p:txBody>
+      </p:sp>
+    </p:spTree>
+  </p:cSld>
+  <p:clrMapOvr>
+    <a:masterClrMapping/>
+  </p:clrMapOvr>
+</p:notes>
+</file>
+
+<file path=ppt/notesSlides/notesSlide8.xml><?xml version="1.0" encoding="utf-8"?>
+<p:notes xmlns:a="http://schemas.openxmlformats.org/drawingml/2006/main" xmlns:r="http://schemas.openxmlformats.org/officeDocument/2006/relationships" xmlns:mc="http://schemas.openxmlformats.org/markup-compatibility/2006" xmlns:mv="urn:schemas-microsoft-com:mac:vml" xmlns:p="http://schemas.openxmlformats.org/presentationml/2006/main" xmlns:c="http://schemas.openxmlformats.org/drawingml/2006/chart" xmlns:dgm="http://schemas.openxmlformats.org/drawingml/2006/diagram" xmlns:o="urn:schemas-microsoft-com:office:office" xmlns:v="urn:schemas-microsoft-com:vml" xmlns:pvml="urn:schemas-microsoft-com:office:powerpoint" xmlns:com="http://schemas.openxmlformats.org/drawingml/2006/compatibility" xmlns:p14="http://schemas.microsoft.com/office/powerpoint/2010/main" showMasterPhAnim="0" showMasterSp="0">
+  <p:cSld>
+    <p:spTree>
+      <p:nvGrpSpPr>
+        <p:cNvPr id="117" name="Shape 117"/>
+        <p:cNvGrpSpPr/>
+        <p:nvPr/>
+      </p:nvGrpSpPr>
+      <p:grpSpPr>
+        <a:xfrm>
+          <a:off x="0" y="0"/>
+          <a:ext cx="0" cy="0"/>
+          <a:chOff x="0" y="0"/>
+          <a:chExt cx="0" cy="0"/>
+        </a:xfrm>
+      </p:grpSpPr>
+      <p:sp>
+        <p:nvSpPr>
+          <p:cNvPr id="118" name="Shape 118"/>
+          <p:cNvSpPr/>
+          <p:nvPr>
+            <p:ph idx="2" type="sldImg"/>
+          </p:nvPr>
+        </p:nvSpPr>
+        <p:spPr>
+          <a:xfrm>
+            <a:off x="381300" y="685800"/>
+            <a:ext cx="6096000" cy="3429000"/>
+          </a:xfrm>
+          <a:custGeom>
+            <a:pathLst>
+              <a:path extrusionOk="0" h="120000" w="120000">
+                <a:moveTo>
+                  <a:pt x="0" y="0"/>
+                </a:moveTo>
+                <a:lnTo>
+                  <a:pt x="120000" y="0"/>
+                </a:lnTo>
+                <a:lnTo>
+                  <a:pt x="120000" y="120000"/>
+                </a:lnTo>
+                <a:lnTo>
+                  <a:pt x="0" y="120000"/>
+                </a:lnTo>
+                <a:close/>
+              </a:path>
+            </a:pathLst>
+          </a:custGeom>
+        </p:spPr>
+      </p:sp>
+      <p:sp>
+        <p:nvSpPr>
+          <p:cNvPr id="119" name="Shape 119"/>
           <p:cNvSpPr txBox="1"/>
           <p:nvPr>
             <p:ph idx="1" type="body"/>
@@ -5654,7 +5750,7 @@
                 <a:cs typeface="Times New Roman"/>
                 <a:sym typeface="Times New Roman"/>
               </a:rPr>
-              <a:t>	- abilitatea de a clasifica corect </a:t>
+              <a:t>	          - abilitatea de a clasifica corect </a:t>
             </a:r>
             <a:r>
               <a:rPr b="1" lang="en-GB">
@@ -6544,7 +6640,7 @@
             <a:tbl>
               <a:tblPr>
                 <a:noFill/>
-                <a:tableStyleId>{8ED1DCBD-6C4C-4477-AA2D-E9037DBFEE18}</a:tableStyleId>
+                <a:tableStyleId>{8B319D91-E11A-43B3-9955-0706FA859666}</a:tableStyleId>
               </a:tblPr>
               <a:tblGrid>
                 <a:gridCol w="685725"/>
@@ -6912,8 +7008,8 @@
         </p:nvSpPr>
         <p:spPr>
           <a:xfrm>
-            <a:off x="311700" y="445025"/>
-            <a:ext cx="8520600" cy="707400"/>
+            <a:off x="311700" y="177725"/>
+            <a:ext cx="8520600" cy="1485900"/>
           </a:xfrm>
           <a:prstGeom prst="rect">
             <a:avLst/>
@@ -6944,6 +7040,38 @@
               <a:t>Media testelor</a:t>
             </a:r>
           </a:p>
+          <a:p>
+            <a:pPr lvl="0">
+              <a:spcBef>
+                <a:spcPts val="0"/>
+              </a:spcBef>
+              <a:buNone/>
+            </a:pPr>
+            <a:r>
+              <a:rPr lang="en-GB">
+                <a:solidFill>
+                  <a:srgbClr val="000000"/>
+                </a:solidFill>
+                <a:latin typeface="Times New Roman"/>
+                <a:ea typeface="Times New Roman"/>
+                <a:cs typeface="Times New Roman"/>
+                <a:sym typeface="Times New Roman"/>
+              </a:rPr>
+              <a:t>	</a:t>
+            </a:r>
+            <a:r>
+              <a:rPr lang="en-GB" sz="3000">
+                <a:solidFill>
+                  <a:srgbClr val="000000"/>
+                </a:solidFill>
+                <a:latin typeface="Times New Roman"/>
+                <a:ea typeface="Times New Roman"/>
+                <a:cs typeface="Times New Roman"/>
+                <a:sym typeface="Times New Roman"/>
+              </a:rPr>
+              <a:t>Support Vector Machine - SVM</a:t>
+            </a:r>
+          </a:p>
         </p:txBody>
       </p:sp>
       <p:sp>
@@ -6956,7 +7084,7 @@
         </p:nvSpPr>
         <p:spPr>
           <a:xfrm>
-            <a:off x="311700" y="1266325"/>
+            <a:off x="311700" y="1663575"/>
             <a:ext cx="8520600" cy="3302700"/>
           </a:xfrm>
           <a:prstGeom prst="rect">
@@ -7151,7 +7279,7 @@
         </p:blipFill>
         <p:spPr>
           <a:xfrm>
-            <a:off x="5563700" y="1266312"/>
+            <a:off x="5563700" y="1871862"/>
             <a:ext cx="1047750" cy="2886075"/>
           </a:xfrm>
           <a:prstGeom prst="rect">
@@ -7179,7 +7307,7 @@
         </p:blipFill>
         <p:spPr>
           <a:xfrm>
-            <a:off x="3826850" y="1266312"/>
+            <a:off x="3826850" y="1871875"/>
             <a:ext cx="1047750" cy="2886075"/>
           </a:xfrm>
           <a:prstGeom prst="rect">
@@ -7207,7 +7335,7 @@
         </p:blipFill>
         <p:spPr>
           <a:xfrm>
-            <a:off x="7300550" y="1418712"/>
+            <a:off x="7300550" y="2024262"/>
             <a:ext cx="1047750" cy="2733675"/>
           </a:xfrm>
           <a:prstGeom prst="rect">
@@ -7751,7 +7879,2491 @@
 </p:sld>
 </file>
 
+<file path=ppt/slides/slide8.xml><?xml version="1.0" encoding="utf-8"?>
+<p:sld xmlns:a="http://schemas.openxmlformats.org/drawingml/2006/main" xmlns:r="http://schemas.openxmlformats.org/officeDocument/2006/relationships" xmlns:mc="http://schemas.openxmlformats.org/markup-compatibility/2006" xmlns:mv="urn:schemas-microsoft-com:mac:vml" xmlns:p="http://schemas.openxmlformats.org/presentationml/2006/main" xmlns:c="http://schemas.openxmlformats.org/drawingml/2006/chart" xmlns:dgm="http://schemas.openxmlformats.org/drawingml/2006/diagram" xmlns:o="urn:schemas-microsoft-com:office:office" xmlns:v="urn:schemas-microsoft-com:vml" xmlns:pvml="urn:schemas-microsoft-com:office:powerpoint" xmlns:com="http://schemas.openxmlformats.org/drawingml/2006/compatibility" xmlns:p14="http://schemas.microsoft.com/office/powerpoint/2010/main">
+  <p:cSld>
+    <p:spTree>
+      <p:nvGrpSpPr>
+        <p:cNvPr id="120" name="Shape 120"/>
+        <p:cNvGrpSpPr/>
+        <p:nvPr/>
+      </p:nvGrpSpPr>
+      <p:grpSpPr>
+        <a:xfrm>
+          <a:off x="0" y="0"/>
+          <a:ext cx="0" cy="0"/>
+          <a:chOff x="0" y="0"/>
+          <a:chExt cx="0" cy="0"/>
+        </a:xfrm>
+      </p:grpSpPr>
+      <p:sp>
+        <p:nvSpPr>
+          <p:cNvPr id="121" name="Shape 121"/>
+          <p:cNvSpPr txBox="1"/>
+          <p:nvPr>
+            <p:ph idx="1" type="body"/>
+          </p:nvPr>
+        </p:nvSpPr>
+        <p:spPr>
+          <a:xfrm>
+            <a:off x="311700" y="334525"/>
+            <a:ext cx="8520600" cy="4578900"/>
+          </a:xfrm>
+          <a:prstGeom prst="rect">
+            <a:avLst/>
+          </a:prstGeom>
+        </p:spPr>
+        <p:txBody>
+          <a:bodyPr anchorCtr="0" anchor="t" bIns="91425" lIns="91425" rIns="91425" tIns="91425">
+            <a:noAutofit/>
+          </a:bodyPr>
+          <a:lstStyle/>
+          <a:p>
+            <a:pPr lvl="0">
+              <a:spcBef>
+                <a:spcPts val="0"/>
+              </a:spcBef>
+              <a:buNone/>
+            </a:pPr>
+            <a:r>
+              <a:t/>
+            </a:r>
+            <a:endParaRPr/>
+          </a:p>
+          <a:p>
+            <a:pPr lvl="0">
+              <a:spcBef>
+                <a:spcPts val="0"/>
+              </a:spcBef>
+              <a:buNone/>
+            </a:pPr>
+            <a:r>
+              <a:t/>
+            </a:r>
+            <a:endParaRPr/>
+          </a:p>
+          <a:p>
+            <a:pPr lvl="0">
+              <a:spcBef>
+                <a:spcPts val="0"/>
+              </a:spcBef>
+              <a:buNone/>
+            </a:pPr>
+            <a:r>
+              <a:t/>
+            </a:r>
+            <a:endParaRPr/>
+          </a:p>
+          <a:p>
+            <a:pPr lvl="0">
+              <a:spcBef>
+                <a:spcPts val="0"/>
+              </a:spcBef>
+              <a:buNone/>
+            </a:pPr>
+            <a:r>
+              <a:t/>
+            </a:r>
+            <a:endParaRPr/>
+          </a:p>
+          <a:p>
+            <a:pPr lvl="0">
+              <a:spcBef>
+                <a:spcPts val="0"/>
+              </a:spcBef>
+              <a:buNone/>
+            </a:pPr>
+            <a:r>
+              <a:t/>
+            </a:r>
+            <a:endParaRPr/>
+          </a:p>
+          <a:p>
+            <a:pPr lvl="0">
+              <a:spcBef>
+                <a:spcPts val="0"/>
+              </a:spcBef>
+              <a:buNone/>
+            </a:pPr>
+            <a:r>
+              <a:t/>
+            </a:r>
+            <a:endParaRPr/>
+          </a:p>
+          <a:p>
+            <a:pPr lvl="0">
+              <a:spcBef>
+                <a:spcPts val="0"/>
+              </a:spcBef>
+              <a:buNone/>
+            </a:pPr>
+            <a:r>
+              <a:t/>
+            </a:r>
+            <a:endParaRPr/>
+          </a:p>
+          <a:p>
+            <a:pPr lvl="0">
+              <a:spcBef>
+                <a:spcPts val="0"/>
+              </a:spcBef>
+              <a:buNone/>
+            </a:pPr>
+            <a:r>
+              <a:t/>
+            </a:r>
+            <a:endParaRPr/>
+          </a:p>
+          <a:p>
+            <a:pPr lvl="0">
+              <a:spcBef>
+                <a:spcPts val="0"/>
+              </a:spcBef>
+              <a:buNone/>
+            </a:pPr>
+            <a:r>
+              <a:rPr lang="en-GB" sz="1600">
+                <a:solidFill>
+                  <a:srgbClr val="000000"/>
+                </a:solidFill>
+                <a:latin typeface="Times New Roman"/>
+                <a:ea typeface="Times New Roman"/>
+                <a:cs typeface="Times New Roman"/>
+                <a:sym typeface="Times New Roman"/>
+              </a:rPr>
+              <a:t>A = with remove stopwords, B = with stemming</a:t>
+            </a:r>
+          </a:p>
+        </p:txBody>
+      </p:sp>
+      <p:graphicFrame>
+        <p:nvGraphicFramePr>
+          <p:cNvPr id="122" name="Shape 122"/>
+          <p:cNvGraphicFramePr/>
+          <p:nvPr/>
+        </p:nvGraphicFramePr>
+        <p:xfrm>
+          <a:off x="952500" y="334525"/>
+          <a:ext cx="3000000" cy="3000000"/>
+        </p:xfrm>
+        <a:graphic>
+          <a:graphicData uri="http://schemas.openxmlformats.org/drawingml/2006/table">
+            <a:tbl>
+              <a:tblPr>
+                <a:noFill/>
+                <a:tableStyleId>{8B319D91-E11A-43B3-9955-0706FA859666}</a:tableStyleId>
+              </a:tblPr>
+              <a:tblGrid>
+                <a:gridCol w="1447800"/>
+                <a:gridCol w="1447800"/>
+                <a:gridCol w="1447800"/>
+                <a:gridCol w="1447800"/>
+                <a:gridCol w="1447800"/>
+              </a:tblGrid>
+              <a:tr h="381000">
+                <a:tc>
+                  <a:txBody>
+                    <a:bodyPr>
+                      <a:noAutofit/>
+                    </a:bodyPr>
+                    <a:lstStyle/>
+                    <a:p>
+                      <a:pPr lvl="0" algn="ctr">
+                        <a:spcBef>
+                          <a:spcPts val="0"/>
+                        </a:spcBef>
+                        <a:buNone/>
+                      </a:pPr>
+                      <a:r>
+                        <a:rPr b="1" lang="en-GB" sz="1500">
+                          <a:latin typeface="Times New Roman"/>
+                          <a:ea typeface="Times New Roman"/>
+                          <a:cs typeface="Times New Roman"/>
+                          <a:sym typeface="Times New Roman"/>
+                        </a:rPr>
+                        <a:t>Clasificator</a:t>
+                      </a:r>
+                    </a:p>
+                  </a:txBody>
+                  <a:tcPr marT="91425" marB="91425" marR="91425" marL="91425">
+                    <a:solidFill>
+                      <a:srgbClr val="CCCCCC"/>
+                    </a:solidFill>
+                  </a:tcPr>
+                </a:tc>
+                <a:tc>
+                  <a:txBody>
+                    <a:bodyPr>
+                      <a:noAutofit/>
+                    </a:bodyPr>
+                    <a:lstStyle/>
+                    <a:p>
+                      <a:pPr lvl="0" algn="ctr">
+                        <a:spcBef>
+                          <a:spcPts val="0"/>
+                        </a:spcBef>
+                        <a:buNone/>
+                      </a:pPr>
+                      <a:r>
+                        <a:rPr b="1" lang="en-GB" sz="1500">
+                          <a:latin typeface="Times New Roman"/>
+                          <a:ea typeface="Times New Roman"/>
+                          <a:cs typeface="Times New Roman"/>
+                          <a:sym typeface="Times New Roman"/>
+                        </a:rPr>
+                        <a:t>Obs</a:t>
+                      </a:r>
+                    </a:p>
+                  </a:txBody>
+                  <a:tcPr marT="91425" marB="91425" marR="91425" marL="91425">
+                    <a:lnB cap="flat" cmpd="sng" w="19050">
+                      <a:solidFill>
+                        <a:srgbClr val="000000"/>
+                      </a:solidFill>
+                      <a:prstDash val="solid"/>
+                      <a:round/>
+                      <a:headEnd len="med" w="med" type="none"/>
+                      <a:tailEnd len="med" w="med" type="none"/>
+                    </a:lnB>
+                    <a:solidFill>
+                      <a:srgbClr val="CCCCCC"/>
+                    </a:solidFill>
+                  </a:tcPr>
+                </a:tc>
+                <a:tc>
+                  <a:txBody>
+                    <a:bodyPr>
+                      <a:noAutofit/>
+                    </a:bodyPr>
+                    <a:lstStyle/>
+                    <a:p>
+                      <a:pPr lvl="0" algn="ctr">
+                        <a:spcBef>
+                          <a:spcPts val="0"/>
+                        </a:spcBef>
+                        <a:buNone/>
+                      </a:pPr>
+                      <a:r>
+                        <a:rPr b="1" lang="en-GB" sz="1500">
+                          <a:latin typeface="Times New Roman"/>
+                          <a:ea typeface="Times New Roman"/>
+                          <a:cs typeface="Times New Roman"/>
+                          <a:sym typeface="Times New Roman"/>
+                        </a:rPr>
+                        <a:t>Precision</a:t>
+                      </a:r>
+                    </a:p>
+                  </a:txBody>
+                  <a:tcPr marT="91425" marB="91425" marR="91425" marL="91425">
+                    <a:lnB cap="flat" cmpd="sng" w="19050">
+                      <a:solidFill>
+                        <a:srgbClr val="000000"/>
+                      </a:solidFill>
+                      <a:prstDash val="solid"/>
+                      <a:round/>
+                      <a:headEnd len="med" w="med" type="none"/>
+                      <a:tailEnd len="med" w="med" type="none"/>
+                    </a:lnB>
+                    <a:solidFill>
+                      <a:srgbClr val="CCCCCC"/>
+                    </a:solidFill>
+                  </a:tcPr>
+                </a:tc>
+                <a:tc>
+                  <a:txBody>
+                    <a:bodyPr>
+                      <a:noAutofit/>
+                    </a:bodyPr>
+                    <a:lstStyle/>
+                    <a:p>
+                      <a:pPr lvl="0" algn="ctr">
+                        <a:spcBef>
+                          <a:spcPts val="0"/>
+                        </a:spcBef>
+                        <a:buNone/>
+                      </a:pPr>
+                      <a:r>
+                        <a:rPr b="1" lang="en-GB" sz="1500">
+                          <a:latin typeface="Times New Roman"/>
+                          <a:ea typeface="Times New Roman"/>
+                          <a:cs typeface="Times New Roman"/>
+                          <a:sym typeface="Times New Roman"/>
+                        </a:rPr>
+                        <a:t>Recall</a:t>
+                      </a:r>
+                    </a:p>
+                  </a:txBody>
+                  <a:tcPr marT="91425" marB="91425" marR="91425" marL="91425">
+                    <a:lnB cap="flat" cmpd="sng" w="19050">
+                      <a:solidFill>
+                        <a:srgbClr val="000000"/>
+                      </a:solidFill>
+                      <a:prstDash val="solid"/>
+                      <a:round/>
+                      <a:headEnd len="med" w="med" type="none"/>
+                      <a:tailEnd len="med" w="med" type="none"/>
+                    </a:lnB>
+                    <a:solidFill>
+                      <a:srgbClr val="CCCCCC"/>
+                    </a:solidFill>
+                  </a:tcPr>
+                </a:tc>
+                <a:tc>
+                  <a:txBody>
+                    <a:bodyPr>
+                      <a:noAutofit/>
+                    </a:bodyPr>
+                    <a:lstStyle/>
+                    <a:p>
+                      <a:pPr lvl="0" algn="ctr">
+                        <a:spcBef>
+                          <a:spcPts val="0"/>
+                        </a:spcBef>
+                        <a:buNone/>
+                      </a:pPr>
+                      <a:r>
+                        <a:rPr b="1" lang="en-GB" sz="1500">
+                          <a:latin typeface="Times New Roman"/>
+                          <a:ea typeface="Times New Roman"/>
+                          <a:cs typeface="Times New Roman"/>
+                          <a:sym typeface="Times New Roman"/>
+                        </a:rPr>
+                        <a:t>F1</a:t>
+                      </a:r>
+                    </a:p>
+                  </a:txBody>
+                  <a:tcPr marT="91425" marB="91425" marR="91425" marL="91425">
+                    <a:lnB cap="flat" cmpd="sng" w="19050">
+                      <a:solidFill>
+                        <a:srgbClr val="000000"/>
+                      </a:solidFill>
+                      <a:prstDash val="solid"/>
+                      <a:round/>
+                      <a:headEnd len="med" w="med" type="none"/>
+                      <a:tailEnd len="med" w="med" type="none"/>
+                    </a:lnB>
+                    <a:solidFill>
+                      <a:srgbClr val="CCCCCC"/>
+                    </a:solidFill>
+                  </a:tcPr>
+                </a:tc>
+              </a:tr>
+              <a:tr h="381000">
+                <a:tc rowSpan="3">
+                  <a:txBody>
+                    <a:bodyPr>
+                      <a:noAutofit/>
+                    </a:bodyPr>
+                    <a:lstStyle/>
+                    <a:p>
+                      <a:pPr lvl="0" rtl="0" algn="ctr">
+                        <a:spcBef>
+                          <a:spcPts val="0"/>
+                        </a:spcBef>
+                        <a:buNone/>
+                      </a:pPr>
+                      <a:r>
+                        <a:t/>
+                      </a:r>
+                      <a:endParaRPr>
+                        <a:latin typeface="Times New Roman"/>
+                        <a:ea typeface="Times New Roman"/>
+                        <a:cs typeface="Times New Roman"/>
+                        <a:sym typeface="Times New Roman"/>
+                      </a:endParaRPr>
+                    </a:p>
+                    <a:p>
+                      <a:pPr lvl="0" rtl="0" algn="ctr">
+                        <a:spcBef>
+                          <a:spcPts val="0"/>
+                        </a:spcBef>
+                        <a:buNone/>
+                      </a:pPr>
+                      <a:r>
+                        <a:t/>
+                      </a:r>
+                      <a:endParaRPr>
+                        <a:latin typeface="Times New Roman"/>
+                        <a:ea typeface="Times New Roman"/>
+                        <a:cs typeface="Times New Roman"/>
+                        <a:sym typeface="Times New Roman"/>
+                      </a:endParaRPr>
+                    </a:p>
+                    <a:p>
+                      <a:pPr lvl="0" rtl="0" algn="ctr">
+                        <a:spcBef>
+                          <a:spcPts val="0"/>
+                        </a:spcBef>
+                        <a:buNone/>
+                      </a:pPr>
+                      <a:r>
+                        <a:rPr lang="en-GB">
+                          <a:latin typeface="Times New Roman"/>
+                          <a:ea typeface="Times New Roman"/>
+                          <a:cs typeface="Times New Roman"/>
+                          <a:sym typeface="Times New Roman"/>
+                        </a:rPr>
+                        <a:t>SVM</a:t>
+                      </a:r>
+                    </a:p>
+                  </a:txBody>
+                  <a:tcPr marT="91425" marB="91425" marR="91425" marL="91425">
+                    <a:lnR cap="flat" cmpd="sng" w="19050">
+                      <a:solidFill>
+                        <a:srgbClr val="000000"/>
+                      </a:solidFill>
+                      <a:prstDash val="solid"/>
+                      <a:round/>
+                      <a:headEnd len="med" w="med" type="none"/>
+                      <a:tailEnd len="med" w="med" type="none"/>
+                    </a:lnR>
+                  </a:tcPr>
+                </a:tc>
+                <a:tc>
+                  <a:txBody>
+                    <a:bodyPr>
+                      <a:noAutofit/>
+                    </a:bodyPr>
+                    <a:lstStyle/>
+                    <a:p>
+                      <a:pPr lvl="0" algn="ctr">
+                        <a:spcBef>
+                          <a:spcPts val="0"/>
+                        </a:spcBef>
+                        <a:buNone/>
+                      </a:pPr>
+                      <a:r>
+                        <a:rPr lang="en-GB">
+                          <a:latin typeface="Times New Roman"/>
+                          <a:ea typeface="Times New Roman"/>
+                          <a:cs typeface="Times New Roman"/>
+                          <a:sym typeface="Times New Roman"/>
+                        </a:rPr>
+                        <a:t>AB</a:t>
+                      </a:r>
+                    </a:p>
+                  </a:txBody>
+                  <a:tcPr marT="91425" marB="91425" marR="91425" marL="91425">
+                    <a:lnL cap="flat" cmpd="sng" w="19050">
+                      <a:solidFill>
+                        <a:srgbClr val="000000"/>
+                      </a:solidFill>
+                      <a:prstDash val="solid"/>
+                      <a:round/>
+                      <a:headEnd len="med" w="med" type="none"/>
+                      <a:tailEnd len="med" w="med" type="none"/>
+                    </a:lnL>
+                    <a:lnR cap="flat" cmpd="sng" w="19050">
+                      <a:solidFill>
+                        <a:srgbClr val="000000"/>
+                      </a:solidFill>
+                      <a:prstDash val="solid"/>
+                      <a:round/>
+                      <a:headEnd len="med" w="med" type="none"/>
+                      <a:tailEnd len="med" w="med" type="none"/>
+                    </a:lnR>
+                    <a:lnT cap="flat" cmpd="sng" w="19050">
+                      <a:solidFill>
+                        <a:srgbClr val="000000"/>
+                      </a:solidFill>
+                      <a:prstDash val="solid"/>
+                      <a:round/>
+                      <a:headEnd len="med" w="med" type="none"/>
+                      <a:tailEnd len="med" w="med" type="none"/>
+                    </a:lnT>
+                    <a:lnB cap="flat" cmpd="sng" w="19050">
+                      <a:solidFill>
+                        <a:srgbClr val="000000"/>
+                      </a:solidFill>
+                      <a:prstDash val="solid"/>
+                      <a:round/>
+                      <a:headEnd len="med" w="med" type="none"/>
+                      <a:tailEnd len="med" w="med" type="none"/>
+                    </a:lnB>
+                  </a:tcPr>
+                </a:tc>
+                <a:tc>
+                  <a:txBody>
+                    <a:bodyPr>
+                      <a:noAutofit/>
+                    </a:bodyPr>
+                    <a:lstStyle/>
+                    <a:p>
+                      <a:pPr lvl="0" algn="ctr">
+                        <a:spcBef>
+                          <a:spcPts val="0"/>
+                        </a:spcBef>
+                        <a:buNone/>
+                      </a:pPr>
+                      <a:r>
+                        <a:rPr lang="en-GB">
+                          <a:latin typeface="Times New Roman"/>
+                          <a:ea typeface="Times New Roman"/>
+                          <a:cs typeface="Times New Roman"/>
+                          <a:sym typeface="Times New Roman"/>
+                        </a:rPr>
+                        <a:t>0.858</a:t>
+                      </a:r>
+                    </a:p>
+                  </a:txBody>
+                  <a:tcPr marT="91425" marB="91425" marR="91425" marL="91425">
+                    <a:lnL cap="flat" cmpd="sng" w="19050">
+                      <a:solidFill>
+                        <a:srgbClr val="000000"/>
+                      </a:solidFill>
+                      <a:prstDash val="solid"/>
+                      <a:round/>
+                      <a:headEnd len="med" w="med" type="none"/>
+                      <a:tailEnd len="med" w="med" type="none"/>
+                    </a:lnL>
+                    <a:lnR cap="flat" cmpd="sng" w="19050">
+                      <a:solidFill>
+                        <a:srgbClr val="000000"/>
+                      </a:solidFill>
+                      <a:prstDash val="solid"/>
+                      <a:round/>
+                      <a:headEnd len="med" w="med" type="none"/>
+                      <a:tailEnd len="med" w="med" type="none"/>
+                    </a:lnR>
+                    <a:lnT cap="flat" cmpd="sng" w="19050">
+                      <a:solidFill>
+                        <a:srgbClr val="000000"/>
+                      </a:solidFill>
+                      <a:prstDash val="solid"/>
+                      <a:round/>
+                      <a:headEnd len="med" w="med" type="none"/>
+                      <a:tailEnd len="med" w="med" type="none"/>
+                    </a:lnT>
+                    <a:lnB cap="flat" cmpd="sng" w="19050">
+                      <a:solidFill>
+                        <a:srgbClr val="000000"/>
+                      </a:solidFill>
+                      <a:prstDash val="solid"/>
+                      <a:round/>
+                      <a:headEnd len="med" w="med" type="none"/>
+                      <a:tailEnd len="med" w="med" type="none"/>
+                    </a:lnB>
+                  </a:tcPr>
+                </a:tc>
+                <a:tc>
+                  <a:txBody>
+                    <a:bodyPr>
+                      <a:noAutofit/>
+                    </a:bodyPr>
+                    <a:lstStyle/>
+                    <a:p>
+                      <a:pPr lvl="0" algn="ctr">
+                        <a:spcBef>
+                          <a:spcPts val="0"/>
+                        </a:spcBef>
+                        <a:buNone/>
+                      </a:pPr>
+                      <a:r>
+                        <a:rPr lang="en-GB">
+                          <a:latin typeface="Times New Roman"/>
+                          <a:ea typeface="Times New Roman"/>
+                          <a:cs typeface="Times New Roman"/>
+                          <a:sym typeface="Times New Roman"/>
+                        </a:rPr>
+                        <a:t>0.815</a:t>
+                      </a:r>
+                    </a:p>
+                  </a:txBody>
+                  <a:tcPr marT="91425" marB="91425" marR="91425" marL="91425">
+                    <a:lnL cap="flat" cmpd="sng" w="19050">
+                      <a:solidFill>
+                        <a:srgbClr val="000000"/>
+                      </a:solidFill>
+                      <a:prstDash val="solid"/>
+                      <a:round/>
+                      <a:headEnd len="med" w="med" type="none"/>
+                      <a:tailEnd len="med" w="med" type="none"/>
+                    </a:lnL>
+                    <a:lnR cap="flat" cmpd="sng" w="19050">
+                      <a:solidFill>
+                        <a:srgbClr val="000000"/>
+                      </a:solidFill>
+                      <a:prstDash val="solid"/>
+                      <a:round/>
+                      <a:headEnd len="med" w="med" type="none"/>
+                      <a:tailEnd len="med" w="med" type="none"/>
+                    </a:lnR>
+                    <a:lnT cap="flat" cmpd="sng" w="19050">
+                      <a:solidFill>
+                        <a:srgbClr val="000000"/>
+                      </a:solidFill>
+                      <a:prstDash val="solid"/>
+                      <a:round/>
+                      <a:headEnd len="med" w="med" type="none"/>
+                      <a:tailEnd len="med" w="med" type="none"/>
+                    </a:lnT>
+                    <a:lnB cap="flat" cmpd="sng" w="19050">
+                      <a:solidFill>
+                        <a:srgbClr val="000000"/>
+                      </a:solidFill>
+                      <a:prstDash val="solid"/>
+                      <a:round/>
+                      <a:headEnd len="med" w="med" type="none"/>
+                      <a:tailEnd len="med" w="med" type="none"/>
+                    </a:lnB>
+                  </a:tcPr>
+                </a:tc>
+                <a:tc>
+                  <a:txBody>
+                    <a:bodyPr>
+                      <a:noAutofit/>
+                    </a:bodyPr>
+                    <a:lstStyle/>
+                    <a:p>
+                      <a:pPr lvl="0" algn="ctr">
+                        <a:spcBef>
+                          <a:spcPts val="0"/>
+                        </a:spcBef>
+                        <a:buNone/>
+                      </a:pPr>
+                      <a:r>
+                        <a:rPr lang="en-GB">
+                          <a:latin typeface="Times New Roman"/>
+                          <a:ea typeface="Times New Roman"/>
+                          <a:cs typeface="Times New Roman"/>
+                          <a:sym typeface="Times New Roman"/>
+                        </a:rPr>
+                        <a:t>0.827</a:t>
+                      </a:r>
+                    </a:p>
+                  </a:txBody>
+                  <a:tcPr marT="91425" marB="91425" marR="91425" marL="91425">
+                    <a:lnL cap="flat" cmpd="sng" w="19050">
+                      <a:solidFill>
+                        <a:srgbClr val="000000"/>
+                      </a:solidFill>
+                      <a:prstDash val="solid"/>
+                      <a:round/>
+                      <a:headEnd len="med" w="med" type="none"/>
+                      <a:tailEnd len="med" w="med" type="none"/>
+                    </a:lnL>
+                    <a:lnR cap="flat" cmpd="sng" w="19050">
+                      <a:solidFill>
+                        <a:srgbClr val="000000"/>
+                      </a:solidFill>
+                      <a:prstDash val="solid"/>
+                      <a:round/>
+                      <a:headEnd len="med" w="med" type="none"/>
+                      <a:tailEnd len="med" w="med" type="none"/>
+                    </a:lnR>
+                    <a:lnT cap="flat" cmpd="sng" w="19050">
+                      <a:solidFill>
+                        <a:srgbClr val="000000"/>
+                      </a:solidFill>
+                      <a:prstDash val="solid"/>
+                      <a:round/>
+                      <a:headEnd len="med" w="med" type="none"/>
+                      <a:tailEnd len="med" w="med" type="none"/>
+                    </a:lnT>
+                    <a:lnB cap="flat" cmpd="sng" w="19050">
+                      <a:solidFill>
+                        <a:srgbClr val="000000"/>
+                      </a:solidFill>
+                      <a:prstDash val="solid"/>
+                      <a:round/>
+                      <a:headEnd len="med" w="med" type="none"/>
+                      <a:tailEnd len="med" w="med" type="none"/>
+                    </a:lnB>
+                  </a:tcPr>
+                </a:tc>
+              </a:tr>
+              <a:tr h="381000">
+                <a:tc vMerge="1"/>
+                <a:tc>
+                  <a:txBody>
+                    <a:bodyPr>
+                      <a:noAutofit/>
+                    </a:bodyPr>
+                    <a:lstStyle/>
+                    <a:p>
+                      <a:pPr lvl="0" algn="ctr">
+                        <a:spcBef>
+                          <a:spcPts val="0"/>
+                        </a:spcBef>
+                        <a:buNone/>
+                      </a:pPr>
+                      <a:r>
+                        <a:rPr lang="en-GB">
+                          <a:latin typeface="Times New Roman"/>
+                          <a:ea typeface="Times New Roman"/>
+                          <a:cs typeface="Times New Roman"/>
+                          <a:sym typeface="Times New Roman"/>
+                        </a:rPr>
+                        <a:t>A</a:t>
+                      </a:r>
+                    </a:p>
+                  </a:txBody>
+                  <a:tcPr marT="91425" marB="91425" marR="91425" marL="91425">
+                    <a:lnT cap="flat" cmpd="sng" w="19050">
+                      <a:solidFill>
+                        <a:srgbClr val="000000"/>
+                      </a:solidFill>
+                      <a:prstDash val="solid"/>
+                      <a:round/>
+                      <a:headEnd len="med" w="med" type="none"/>
+                      <a:tailEnd len="med" w="med" type="none"/>
+                    </a:lnT>
+                  </a:tcPr>
+                </a:tc>
+                <a:tc>
+                  <a:txBody>
+                    <a:bodyPr>
+                      <a:noAutofit/>
+                    </a:bodyPr>
+                    <a:lstStyle/>
+                    <a:p>
+                      <a:pPr lvl="0" algn="ctr">
+                        <a:spcBef>
+                          <a:spcPts val="0"/>
+                        </a:spcBef>
+                        <a:buNone/>
+                      </a:pPr>
+                      <a:r>
+                        <a:rPr lang="en-GB">
+                          <a:latin typeface="Times New Roman"/>
+                          <a:ea typeface="Times New Roman"/>
+                          <a:cs typeface="Times New Roman"/>
+                          <a:sym typeface="Times New Roman"/>
+                        </a:rPr>
+                        <a:t>0.881</a:t>
+                      </a:r>
+                    </a:p>
+                  </a:txBody>
+                  <a:tcPr marT="91425" marB="91425" marR="91425" marL="91425">
+                    <a:lnT cap="flat" cmpd="sng" w="19050">
+                      <a:solidFill>
+                        <a:srgbClr val="000000"/>
+                      </a:solidFill>
+                      <a:prstDash val="solid"/>
+                      <a:round/>
+                      <a:headEnd len="med" w="med" type="none"/>
+                      <a:tailEnd len="med" w="med" type="none"/>
+                    </a:lnT>
+                  </a:tcPr>
+                </a:tc>
+                <a:tc>
+                  <a:txBody>
+                    <a:bodyPr>
+                      <a:noAutofit/>
+                    </a:bodyPr>
+                    <a:lstStyle/>
+                    <a:p>
+                      <a:pPr lvl="0" algn="ctr">
+                        <a:spcBef>
+                          <a:spcPts val="0"/>
+                        </a:spcBef>
+                        <a:buNone/>
+                      </a:pPr>
+                      <a:r>
+                        <a:rPr lang="en-GB">
+                          <a:latin typeface="Times New Roman"/>
+                          <a:ea typeface="Times New Roman"/>
+                          <a:cs typeface="Times New Roman"/>
+                          <a:sym typeface="Times New Roman"/>
+                        </a:rPr>
+                        <a:t>0.800</a:t>
+                      </a:r>
+                    </a:p>
+                  </a:txBody>
+                  <a:tcPr marT="91425" marB="91425" marR="91425" marL="91425">
+                    <a:lnT cap="flat" cmpd="sng" w="19050">
+                      <a:solidFill>
+                        <a:srgbClr val="000000"/>
+                      </a:solidFill>
+                      <a:prstDash val="solid"/>
+                      <a:round/>
+                      <a:headEnd len="med" w="med" type="none"/>
+                      <a:tailEnd len="med" w="med" type="none"/>
+                    </a:lnT>
+                  </a:tcPr>
+                </a:tc>
+                <a:tc>
+                  <a:txBody>
+                    <a:bodyPr>
+                      <a:noAutofit/>
+                    </a:bodyPr>
+                    <a:lstStyle/>
+                    <a:p>
+                      <a:pPr lvl="0" algn="ctr">
+                        <a:spcBef>
+                          <a:spcPts val="0"/>
+                        </a:spcBef>
+                        <a:buNone/>
+                      </a:pPr>
+                      <a:r>
+                        <a:rPr lang="en-GB">
+                          <a:latin typeface="Times New Roman"/>
+                          <a:ea typeface="Times New Roman"/>
+                          <a:cs typeface="Times New Roman"/>
+                          <a:sym typeface="Times New Roman"/>
+                        </a:rPr>
+                        <a:t>0.828</a:t>
+                      </a:r>
+                    </a:p>
+                  </a:txBody>
+                  <a:tcPr marT="91425" marB="91425" marR="91425" marL="91425">
+                    <a:lnT cap="flat" cmpd="sng" w="19050">
+                      <a:solidFill>
+                        <a:srgbClr val="000000"/>
+                      </a:solidFill>
+                      <a:prstDash val="solid"/>
+                      <a:round/>
+                      <a:headEnd len="med" w="med" type="none"/>
+                      <a:tailEnd len="med" w="med" type="none"/>
+                    </a:lnT>
+                  </a:tcPr>
+                </a:tc>
+              </a:tr>
+              <a:tr h="381000">
+                <a:tc vMerge="1"/>
+                <a:tc>
+                  <a:txBody>
+                    <a:bodyPr>
+                      <a:noAutofit/>
+                    </a:bodyPr>
+                    <a:lstStyle/>
+                    <a:p>
+                      <a:pPr lvl="0" algn="ctr">
+                        <a:spcBef>
+                          <a:spcPts val="0"/>
+                        </a:spcBef>
+                        <a:buNone/>
+                      </a:pPr>
+                      <a:r>
+                        <a:rPr lang="en-GB">
+                          <a:latin typeface="Times New Roman"/>
+                          <a:ea typeface="Times New Roman"/>
+                          <a:cs typeface="Times New Roman"/>
+                          <a:sym typeface="Times New Roman"/>
+                        </a:rPr>
+                        <a:t>-</a:t>
+                      </a:r>
+                    </a:p>
+                  </a:txBody>
+                  <a:tcPr marT="91425" marB="91425" marR="91425" marL="91425">
+                    <a:lnB cap="flat" cmpd="sng" w="19050">
+                      <a:solidFill>
+                        <a:srgbClr val="000000"/>
+                      </a:solidFill>
+                      <a:prstDash val="solid"/>
+                      <a:round/>
+                      <a:headEnd len="med" w="med" type="none"/>
+                      <a:tailEnd len="med" w="med" type="none"/>
+                    </a:lnB>
+                  </a:tcPr>
+                </a:tc>
+                <a:tc>
+                  <a:txBody>
+                    <a:bodyPr>
+                      <a:noAutofit/>
+                    </a:bodyPr>
+                    <a:lstStyle/>
+                    <a:p>
+                      <a:pPr lvl="0" algn="ctr">
+                        <a:spcBef>
+                          <a:spcPts val="0"/>
+                        </a:spcBef>
+                        <a:buNone/>
+                      </a:pPr>
+                      <a:r>
+                        <a:rPr lang="en-GB">
+                          <a:latin typeface="Times New Roman"/>
+                          <a:ea typeface="Times New Roman"/>
+                          <a:cs typeface="Times New Roman"/>
+                          <a:sym typeface="Times New Roman"/>
+                        </a:rPr>
+                        <a:t>0.868</a:t>
+                      </a:r>
+                    </a:p>
+                  </a:txBody>
+                  <a:tcPr marT="91425" marB="91425" marR="91425" marL="91425">
+                    <a:lnB cap="flat" cmpd="sng" w="19050">
+                      <a:solidFill>
+                        <a:srgbClr val="000000"/>
+                      </a:solidFill>
+                      <a:prstDash val="solid"/>
+                      <a:round/>
+                      <a:headEnd len="med" w="med" type="none"/>
+                      <a:tailEnd len="med" w="med" type="none"/>
+                    </a:lnB>
+                  </a:tcPr>
+                </a:tc>
+                <a:tc>
+                  <a:txBody>
+                    <a:bodyPr>
+                      <a:noAutofit/>
+                    </a:bodyPr>
+                    <a:lstStyle/>
+                    <a:p>
+                      <a:pPr lvl="0" algn="ctr">
+                        <a:spcBef>
+                          <a:spcPts val="0"/>
+                        </a:spcBef>
+                        <a:buNone/>
+                      </a:pPr>
+                      <a:r>
+                        <a:rPr lang="en-GB">
+                          <a:latin typeface="Times New Roman"/>
+                          <a:ea typeface="Times New Roman"/>
+                          <a:cs typeface="Times New Roman"/>
+                          <a:sym typeface="Times New Roman"/>
+                        </a:rPr>
+                        <a:t>0.827</a:t>
+                      </a:r>
+                    </a:p>
+                  </a:txBody>
+                  <a:tcPr marT="91425" marB="91425" marR="91425" marL="91425">
+                    <a:lnB cap="flat" cmpd="sng" w="19050">
+                      <a:solidFill>
+                        <a:srgbClr val="000000"/>
+                      </a:solidFill>
+                      <a:prstDash val="solid"/>
+                      <a:round/>
+                      <a:headEnd len="med" w="med" type="none"/>
+                      <a:tailEnd len="med" w="med" type="none"/>
+                    </a:lnB>
+                  </a:tcPr>
+                </a:tc>
+                <a:tc>
+                  <a:txBody>
+                    <a:bodyPr>
+                      <a:noAutofit/>
+                    </a:bodyPr>
+                    <a:lstStyle/>
+                    <a:p>
+                      <a:pPr lvl="0" algn="ctr">
+                        <a:spcBef>
+                          <a:spcPts val="0"/>
+                        </a:spcBef>
+                        <a:buNone/>
+                      </a:pPr>
+                      <a:r>
+                        <a:rPr lang="en-GB">
+                          <a:latin typeface="Times New Roman"/>
+                          <a:ea typeface="Times New Roman"/>
+                          <a:cs typeface="Times New Roman"/>
+                          <a:sym typeface="Times New Roman"/>
+                        </a:rPr>
+                        <a:t>0.838</a:t>
+                      </a:r>
+                    </a:p>
+                  </a:txBody>
+                  <a:tcPr marT="91425" marB="91425" marR="91425" marL="91425">
+                    <a:lnB cap="flat" cmpd="sng" w="19050">
+                      <a:solidFill>
+                        <a:srgbClr val="000000"/>
+                      </a:solidFill>
+                      <a:prstDash val="solid"/>
+                      <a:round/>
+                      <a:headEnd len="med" w="med" type="none"/>
+                      <a:tailEnd len="med" w="med" type="none"/>
+                    </a:lnB>
+                    <a:solidFill>
+                      <a:srgbClr val="6AA84F"/>
+                    </a:solidFill>
+                  </a:tcPr>
+                </a:tc>
+              </a:tr>
+              <a:tr h="381000">
+                <a:tc rowSpan="3">
+                  <a:txBody>
+                    <a:bodyPr>
+                      <a:noAutofit/>
+                    </a:bodyPr>
+                    <a:lstStyle/>
+                    <a:p>
+                      <a:pPr lvl="0" rtl="0" algn="ctr">
+                        <a:spcBef>
+                          <a:spcPts val="0"/>
+                        </a:spcBef>
+                        <a:buNone/>
+                      </a:pPr>
+                      <a:r>
+                        <a:t/>
+                      </a:r>
+                      <a:endParaRPr>
+                        <a:latin typeface="Times New Roman"/>
+                        <a:ea typeface="Times New Roman"/>
+                        <a:cs typeface="Times New Roman"/>
+                        <a:sym typeface="Times New Roman"/>
+                      </a:endParaRPr>
+                    </a:p>
+                    <a:p>
+                      <a:pPr lvl="0" rtl="0" algn="ctr">
+                        <a:spcBef>
+                          <a:spcPts val="0"/>
+                        </a:spcBef>
+                        <a:buNone/>
+                      </a:pPr>
+                      <a:r>
+                        <a:t/>
+                      </a:r>
+                      <a:endParaRPr>
+                        <a:latin typeface="Times New Roman"/>
+                        <a:ea typeface="Times New Roman"/>
+                        <a:cs typeface="Times New Roman"/>
+                        <a:sym typeface="Times New Roman"/>
+                      </a:endParaRPr>
+                    </a:p>
+                    <a:p>
+                      <a:pPr lvl="0" rtl="0" algn="ctr">
+                        <a:spcBef>
+                          <a:spcPts val="0"/>
+                        </a:spcBef>
+                        <a:buNone/>
+                      </a:pPr>
+                      <a:r>
+                        <a:rPr lang="en-GB">
+                          <a:latin typeface="Times New Roman"/>
+                          <a:ea typeface="Times New Roman"/>
+                          <a:cs typeface="Times New Roman"/>
+                          <a:sym typeface="Times New Roman"/>
+                        </a:rPr>
+                        <a:t>Naive-Bayes</a:t>
+                      </a:r>
+                    </a:p>
+                  </a:txBody>
+                  <a:tcPr marT="91425" marB="91425" marR="91425" marL="91425">
+                    <a:lnR cap="flat" cmpd="sng" w="19050">
+                      <a:solidFill>
+                        <a:srgbClr val="000000"/>
+                      </a:solidFill>
+                      <a:prstDash val="solid"/>
+                      <a:round/>
+                      <a:headEnd len="med" w="med" type="none"/>
+                      <a:tailEnd len="med" w="med" type="none"/>
+                    </a:lnR>
+                  </a:tcPr>
+                </a:tc>
+                <a:tc>
+                  <a:txBody>
+                    <a:bodyPr>
+                      <a:noAutofit/>
+                    </a:bodyPr>
+                    <a:lstStyle/>
+                    <a:p>
+                      <a:pPr lvl="0" algn="ctr">
+                        <a:spcBef>
+                          <a:spcPts val="0"/>
+                        </a:spcBef>
+                        <a:buNone/>
+                      </a:pPr>
+                      <a:r>
+                        <a:rPr lang="en-GB">
+                          <a:latin typeface="Times New Roman"/>
+                          <a:ea typeface="Times New Roman"/>
+                          <a:cs typeface="Times New Roman"/>
+                          <a:sym typeface="Times New Roman"/>
+                        </a:rPr>
+                        <a:t>AB</a:t>
+                      </a:r>
+                    </a:p>
+                  </a:txBody>
+                  <a:tcPr marT="91425" marB="91425" marR="91425" marL="91425">
+                    <a:lnL cap="flat" cmpd="sng" w="19050">
+                      <a:solidFill>
+                        <a:srgbClr val="000000"/>
+                      </a:solidFill>
+                      <a:prstDash val="solid"/>
+                      <a:round/>
+                      <a:headEnd len="med" w="med" type="none"/>
+                      <a:tailEnd len="med" w="med" type="none"/>
+                    </a:lnL>
+                    <a:lnR cap="flat" cmpd="sng" w="19050">
+                      <a:solidFill>
+                        <a:srgbClr val="000000"/>
+                      </a:solidFill>
+                      <a:prstDash val="solid"/>
+                      <a:round/>
+                      <a:headEnd len="med" w="med" type="none"/>
+                      <a:tailEnd len="med" w="med" type="none"/>
+                    </a:lnR>
+                    <a:lnT cap="flat" cmpd="sng" w="19050">
+                      <a:solidFill>
+                        <a:srgbClr val="000000"/>
+                      </a:solidFill>
+                      <a:prstDash val="solid"/>
+                      <a:round/>
+                      <a:headEnd len="med" w="med" type="none"/>
+                      <a:tailEnd len="med" w="med" type="none"/>
+                    </a:lnT>
+                    <a:lnB cap="flat" cmpd="sng" w="19050">
+                      <a:solidFill>
+                        <a:srgbClr val="000000"/>
+                      </a:solidFill>
+                      <a:prstDash val="solid"/>
+                      <a:round/>
+                      <a:headEnd len="med" w="med" type="none"/>
+                      <a:tailEnd len="med" w="med" type="none"/>
+                    </a:lnB>
+                  </a:tcPr>
+                </a:tc>
+                <a:tc>
+                  <a:txBody>
+                    <a:bodyPr>
+                      <a:noAutofit/>
+                    </a:bodyPr>
+                    <a:lstStyle/>
+                    <a:p>
+                      <a:pPr lvl="0" algn="ctr">
+                        <a:spcBef>
+                          <a:spcPts val="0"/>
+                        </a:spcBef>
+                        <a:buNone/>
+                      </a:pPr>
+                      <a:r>
+                        <a:rPr lang="en-GB">
+                          <a:latin typeface="Times New Roman"/>
+                          <a:ea typeface="Times New Roman"/>
+                          <a:cs typeface="Times New Roman"/>
+                          <a:sym typeface="Times New Roman"/>
+                        </a:rPr>
+                        <a:t>0.791</a:t>
+                      </a:r>
+                    </a:p>
+                  </a:txBody>
+                  <a:tcPr marT="91425" marB="91425" marR="91425" marL="91425">
+                    <a:lnL cap="flat" cmpd="sng" w="19050">
+                      <a:solidFill>
+                        <a:srgbClr val="000000"/>
+                      </a:solidFill>
+                      <a:prstDash val="solid"/>
+                      <a:round/>
+                      <a:headEnd len="med" w="med" type="none"/>
+                      <a:tailEnd len="med" w="med" type="none"/>
+                    </a:lnL>
+                    <a:lnR cap="flat" cmpd="sng" w="19050">
+                      <a:solidFill>
+                        <a:srgbClr val="000000"/>
+                      </a:solidFill>
+                      <a:prstDash val="solid"/>
+                      <a:round/>
+                      <a:headEnd len="med" w="med" type="none"/>
+                      <a:tailEnd len="med" w="med" type="none"/>
+                    </a:lnR>
+                    <a:lnT cap="flat" cmpd="sng" w="19050">
+                      <a:solidFill>
+                        <a:srgbClr val="000000"/>
+                      </a:solidFill>
+                      <a:prstDash val="solid"/>
+                      <a:round/>
+                      <a:headEnd len="med" w="med" type="none"/>
+                      <a:tailEnd len="med" w="med" type="none"/>
+                    </a:lnT>
+                    <a:lnB cap="flat" cmpd="sng" w="19050">
+                      <a:solidFill>
+                        <a:srgbClr val="000000"/>
+                      </a:solidFill>
+                      <a:prstDash val="solid"/>
+                      <a:round/>
+                      <a:headEnd len="med" w="med" type="none"/>
+                      <a:tailEnd len="med" w="med" type="none"/>
+                    </a:lnB>
+                  </a:tcPr>
+                </a:tc>
+                <a:tc>
+                  <a:txBody>
+                    <a:bodyPr>
+                      <a:noAutofit/>
+                    </a:bodyPr>
+                    <a:lstStyle/>
+                    <a:p>
+                      <a:pPr lvl="0" algn="ctr">
+                        <a:spcBef>
+                          <a:spcPts val="0"/>
+                        </a:spcBef>
+                        <a:buNone/>
+                      </a:pPr>
+                      <a:r>
+                        <a:rPr lang="en-GB">
+                          <a:latin typeface="Times New Roman"/>
+                          <a:ea typeface="Times New Roman"/>
+                          <a:cs typeface="Times New Roman"/>
+                          <a:sym typeface="Times New Roman"/>
+                        </a:rPr>
+                        <a:t>0.780</a:t>
+                      </a:r>
+                    </a:p>
+                  </a:txBody>
+                  <a:tcPr marT="91425" marB="91425" marR="91425" marL="91425">
+                    <a:lnL cap="flat" cmpd="sng" w="19050">
+                      <a:solidFill>
+                        <a:srgbClr val="000000"/>
+                      </a:solidFill>
+                      <a:prstDash val="solid"/>
+                      <a:round/>
+                      <a:headEnd len="med" w="med" type="none"/>
+                      <a:tailEnd len="med" w="med" type="none"/>
+                    </a:lnL>
+                    <a:lnR cap="flat" cmpd="sng" w="19050">
+                      <a:solidFill>
+                        <a:srgbClr val="000000"/>
+                      </a:solidFill>
+                      <a:prstDash val="solid"/>
+                      <a:round/>
+                      <a:headEnd len="med" w="med" type="none"/>
+                      <a:tailEnd len="med" w="med" type="none"/>
+                    </a:lnR>
+                    <a:lnT cap="flat" cmpd="sng" w="19050">
+                      <a:solidFill>
+                        <a:srgbClr val="000000"/>
+                      </a:solidFill>
+                      <a:prstDash val="solid"/>
+                      <a:round/>
+                      <a:headEnd len="med" w="med" type="none"/>
+                      <a:tailEnd len="med" w="med" type="none"/>
+                    </a:lnT>
+                    <a:lnB cap="flat" cmpd="sng" w="19050">
+                      <a:solidFill>
+                        <a:srgbClr val="000000"/>
+                      </a:solidFill>
+                      <a:prstDash val="solid"/>
+                      <a:round/>
+                      <a:headEnd len="med" w="med" type="none"/>
+                      <a:tailEnd len="med" w="med" type="none"/>
+                    </a:lnB>
+                  </a:tcPr>
+                </a:tc>
+                <a:tc>
+                  <a:txBody>
+                    <a:bodyPr>
+                      <a:noAutofit/>
+                    </a:bodyPr>
+                    <a:lstStyle/>
+                    <a:p>
+                      <a:pPr lvl="0" algn="ctr">
+                        <a:spcBef>
+                          <a:spcPts val="0"/>
+                        </a:spcBef>
+                        <a:buNone/>
+                      </a:pPr>
+                      <a:r>
+                        <a:rPr lang="en-GB">
+                          <a:latin typeface="Times New Roman"/>
+                          <a:ea typeface="Times New Roman"/>
+                          <a:cs typeface="Times New Roman"/>
+                          <a:sym typeface="Times New Roman"/>
+                        </a:rPr>
+                        <a:t>0.781</a:t>
+                      </a:r>
+                    </a:p>
+                  </a:txBody>
+                  <a:tcPr marT="91425" marB="91425" marR="91425" marL="91425">
+                    <a:lnL cap="flat" cmpd="sng" w="19050">
+                      <a:solidFill>
+                        <a:srgbClr val="000000"/>
+                      </a:solidFill>
+                      <a:prstDash val="solid"/>
+                      <a:round/>
+                      <a:headEnd len="med" w="med" type="none"/>
+                      <a:tailEnd len="med" w="med" type="none"/>
+                    </a:lnL>
+                    <a:lnR cap="flat" cmpd="sng" w="19050">
+                      <a:solidFill>
+                        <a:srgbClr val="000000"/>
+                      </a:solidFill>
+                      <a:prstDash val="solid"/>
+                      <a:round/>
+                      <a:headEnd len="med" w="med" type="none"/>
+                      <a:tailEnd len="med" w="med" type="none"/>
+                    </a:lnR>
+                    <a:lnT cap="flat" cmpd="sng" w="19050">
+                      <a:solidFill>
+                        <a:srgbClr val="000000"/>
+                      </a:solidFill>
+                      <a:prstDash val="solid"/>
+                      <a:round/>
+                      <a:headEnd len="med" w="med" type="none"/>
+                      <a:tailEnd len="med" w="med" type="none"/>
+                    </a:lnT>
+                    <a:lnB cap="flat" cmpd="sng" w="19050">
+                      <a:solidFill>
+                        <a:srgbClr val="000000"/>
+                      </a:solidFill>
+                      <a:prstDash val="solid"/>
+                      <a:round/>
+                      <a:headEnd len="med" w="med" type="none"/>
+                      <a:tailEnd len="med" w="med" type="none"/>
+                    </a:lnB>
+                  </a:tcPr>
+                </a:tc>
+              </a:tr>
+              <a:tr h="381000">
+                <a:tc vMerge="1"/>
+                <a:tc>
+                  <a:txBody>
+                    <a:bodyPr>
+                      <a:noAutofit/>
+                    </a:bodyPr>
+                    <a:lstStyle/>
+                    <a:p>
+                      <a:pPr lvl="0" algn="ctr">
+                        <a:spcBef>
+                          <a:spcPts val="0"/>
+                        </a:spcBef>
+                        <a:buNone/>
+                      </a:pPr>
+                      <a:r>
+                        <a:rPr lang="en-GB">
+                          <a:latin typeface="Times New Roman"/>
+                          <a:ea typeface="Times New Roman"/>
+                          <a:cs typeface="Times New Roman"/>
+                          <a:sym typeface="Times New Roman"/>
+                        </a:rPr>
+                        <a:t>A</a:t>
+                      </a:r>
+                    </a:p>
+                  </a:txBody>
+                  <a:tcPr marT="91425" marB="91425" marR="91425" marL="91425">
+                    <a:lnT cap="flat" cmpd="sng" w="19050">
+                      <a:solidFill>
+                        <a:srgbClr val="000000"/>
+                      </a:solidFill>
+                      <a:prstDash val="solid"/>
+                      <a:round/>
+                      <a:headEnd len="med" w="med" type="none"/>
+                      <a:tailEnd len="med" w="med" type="none"/>
+                    </a:lnT>
+                  </a:tcPr>
+                </a:tc>
+                <a:tc>
+                  <a:txBody>
+                    <a:bodyPr>
+                      <a:noAutofit/>
+                    </a:bodyPr>
+                    <a:lstStyle/>
+                    <a:p>
+                      <a:pPr lvl="0" algn="ctr">
+                        <a:spcBef>
+                          <a:spcPts val="0"/>
+                        </a:spcBef>
+                        <a:buNone/>
+                      </a:pPr>
+                      <a:r>
+                        <a:rPr lang="en-GB">
+                          <a:latin typeface="Times New Roman"/>
+                          <a:ea typeface="Times New Roman"/>
+                          <a:cs typeface="Times New Roman"/>
+                          <a:sym typeface="Times New Roman"/>
+                        </a:rPr>
+                        <a:t>0.779</a:t>
+                      </a:r>
+                    </a:p>
+                  </a:txBody>
+                  <a:tcPr marT="91425" marB="91425" marR="91425" marL="91425">
+                    <a:lnT cap="flat" cmpd="sng" w="19050">
+                      <a:solidFill>
+                        <a:srgbClr val="000000"/>
+                      </a:solidFill>
+                      <a:prstDash val="solid"/>
+                      <a:round/>
+                      <a:headEnd len="med" w="med" type="none"/>
+                      <a:tailEnd len="med" w="med" type="none"/>
+                    </a:lnT>
+                  </a:tcPr>
+                </a:tc>
+                <a:tc>
+                  <a:txBody>
+                    <a:bodyPr>
+                      <a:noAutofit/>
+                    </a:bodyPr>
+                    <a:lstStyle/>
+                    <a:p>
+                      <a:pPr lvl="0" algn="ctr">
+                        <a:spcBef>
+                          <a:spcPts val="0"/>
+                        </a:spcBef>
+                        <a:buNone/>
+                      </a:pPr>
+                      <a:r>
+                        <a:rPr lang="en-GB">
+                          <a:latin typeface="Times New Roman"/>
+                          <a:ea typeface="Times New Roman"/>
+                          <a:cs typeface="Times New Roman"/>
+                          <a:sym typeface="Times New Roman"/>
+                        </a:rPr>
+                        <a:t>0.785</a:t>
+                      </a:r>
+                    </a:p>
+                  </a:txBody>
+                  <a:tcPr marT="91425" marB="91425" marR="91425" marL="91425">
+                    <a:lnT cap="flat" cmpd="sng" w="19050">
+                      <a:solidFill>
+                        <a:srgbClr val="000000"/>
+                      </a:solidFill>
+                      <a:prstDash val="solid"/>
+                      <a:round/>
+                      <a:headEnd len="med" w="med" type="none"/>
+                      <a:tailEnd len="med" w="med" type="none"/>
+                    </a:lnT>
+                  </a:tcPr>
+                </a:tc>
+                <a:tc>
+                  <a:txBody>
+                    <a:bodyPr>
+                      <a:noAutofit/>
+                    </a:bodyPr>
+                    <a:lstStyle/>
+                    <a:p>
+                      <a:pPr lvl="0" algn="ctr">
+                        <a:spcBef>
+                          <a:spcPts val="0"/>
+                        </a:spcBef>
+                        <a:buNone/>
+                      </a:pPr>
+                      <a:r>
+                        <a:rPr lang="en-GB">
+                          <a:latin typeface="Times New Roman"/>
+                          <a:ea typeface="Times New Roman"/>
+                          <a:cs typeface="Times New Roman"/>
+                          <a:sym typeface="Times New Roman"/>
+                        </a:rPr>
+                        <a:t>0.776</a:t>
+                      </a:r>
+                    </a:p>
+                  </a:txBody>
+                  <a:tcPr marT="91425" marB="91425" marR="91425" marL="91425">
+                    <a:lnT cap="flat" cmpd="sng" w="19050">
+                      <a:solidFill>
+                        <a:srgbClr val="000000"/>
+                      </a:solidFill>
+                      <a:prstDash val="solid"/>
+                      <a:round/>
+                      <a:headEnd len="med" w="med" type="none"/>
+                      <a:tailEnd len="med" w="med" type="none"/>
+                    </a:lnT>
+                  </a:tcPr>
+                </a:tc>
+              </a:tr>
+              <a:tr h="381000">
+                <a:tc vMerge="1"/>
+                <a:tc>
+                  <a:txBody>
+                    <a:bodyPr>
+                      <a:noAutofit/>
+                    </a:bodyPr>
+                    <a:lstStyle/>
+                    <a:p>
+                      <a:pPr lvl="0" algn="ctr">
+                        <a:spcBef>
+                          <a:spcPts val="0"/>
+                        </a:spcBef>
+                        <a:buNone/>
+                      </a:pPr>
+                      <a:r>
+                        <a:rPr lang="en-GB">
+                          <a:latin typeface="Times New Roman"/>
+                          <a:ea typeface="Times New Roman"/>
+                          <a:cs typeface="Times New Roman"/>
+                          <a:sym typeface="Times New Roman"/>
+                        </a:rPr>
+                        <a:t>-</a:t>
+                      </a:r>
+                    </a:p>
+                  </a:txBody>
+                  <a:tcPr marT="91425" marB="91425" marR="91425" marL="91425">
+                    <a:lnB cap="flat" cmpd="sng" w="19050">
+                      <a:solidFill>
+                        <a:srgbClr val="000000"/>
+                      </a:solidFill>
+                      <a:prstDash val="solid"/>
+                      <a:round/>
+                      <a:headEnd len="med" w="med" type="none"/>
+                      <a:tailEnd len="med" w="med" type="none"/>
+                    </a:lnB>
+                  </a:tcPr>
+                </a:tc>
+                <a:tc>
+                  <a:txBody>
+                    <a:bodyPr>
+                      <a:noAutofit/>
+                    </a:bodyPr>
+                    <a:lstStyle/>
+                    <a:p>
+                      <a:pPr lvl="0" algn="ctr">
+                        <a:spcBef>
+                          <a:spcPts val="0"/>
+                        </a:spcBef>
+                        <a:buNone/>
+                      </a:pPr>
+                      <a:r>
+                        <a:rPr lang="en-GB">
+                          <a:latin typeface="Times New Roman"/>
+                          <a:ea typeface="Times New Roman"/>
+                          <a:cs typeface="Times New Roman"/>
+                          <a:sym typeface="Times New Roman"/>
+                        </a:rPr>
+                        <a:t>0.771</a:t>
+                      </a:r>
+                    </a:p>
+                  </a:txBody>
+                  <a:tcPr marT="91425" marB="91425" marR="91425" marL="91425">
+                    <a:lnB cap="flat" cmpd="sng" w="19050">
+                      <a:solidFill>
+                        <a:srgbClr val="000000"/>
+                      </a:solidFill>
+                      <a:prstDash val="solid"/>
+                      <a:round/>
+                      <a:headEnd len="med" w="med" type="none"/>
+                      <a:tailEnd len="med" w="med" type="none"/>
+                    </a:lnB>
+                  </a:tcPr>
+                </a:tc>
+                <a:tc>
+                  <a:txBody>
+                    <a:bodyPr>
+                      <a:noAutofit/>
+                    </a:bodyPr>
+                    <a:lstStyle/>
+                    <a:p>
+                      <a:pPr lvl="0" algn="ctr">
+                        <a:spcBef>
+                          <a:spcPts val="0"/>
+                        </a:spcBef>
+                        <a:buNone/>
+                      </a:pPr>
+                      <a:r>
+                        <a:rPr lang="en-GB">
+                          <a:latin typeface="Times New Roman"/>
+                          <a:ea typeface="Times New Roman"/>
+                          <a:cs typeface="Times New Roman"/>
+                          <a:sym typeface="Times New Roman"/>
+                        </a:rPr>
+                        <a:t>0.786</a:t>
+                      </a:r>
+                    </a:p>
+                  </a:txBody>
+                  <a:tcPr marT="91425" marB="91425" marR="91425" marL="91425">
+                    <a:lnB cap="flat" cmpd="sng" w="19050">
+                      <a:solidFill>
+                        <a:srgbClr val="000000"/>
+                      </a:solidFill>
+                      <a:prstDash val="solid"/>
+                      <a:round/>
+                      <a:headEnd len="med" w="med" type="none"/>
+                      <a:tailEnd len="med" w="med" type="none"/>
+                    </a:lnB>
+                  </a:tcPr>
+                </a:tc>
+                <a:tc>
+                  <a:txBody>
+                    <a:bodyPr>
+                      <a:noAutofit/>
+                    </a:bodyPr>
+                    <a:lstStyle/>
+                    <a:p>
+                      <a:pPr lvl="0" algn="ctr">
+                        <a:spcBef>
+                          <a:spcPts val="0"/>
+                        </a:spcBef>
+                        <a:buNone/>
+                      </a:pPr>
+                      <a:r>
+                        <a:rPr lang="en-GB">
+                          <a:latin typeface="Times New Roman"/>
+                          <a:ea typeface="Times New Roman"/>
+                          <a:cs typeface="Times New Roman"/>
+                          <a:sym typeface="Times New Roman"/>
+                        </a:rPr>
+                        <a:t>0.771</a:t>
+                      </a:r>
+                    </a:p>
+                  </a:txBody>
+                  <a:tcPr marT="91425" marB="91425" marR="91425" marL="91425">
+                    <a:lnB cap="flat" cmpd="sng" w="19050">
+                      <a:solidFill>
+                        <a:srgbClr val="000000"/>
+                      </a:solidFill>
+                      <a:prstDash val="solid"/>
+                      <a:round/>
+                      <a:headEnd len="med" w="med" type="none"/>
+                      <a:tailEnd len="med" w="med" type="none"/>
+                    </a:lnB>
+                  </a:tcPr>
+                </a:tc>
+              </a:tr>
+              <a:tr h="381000">
+                <a:tc rowSpan="3">
+                  <a:txBody>
+                    <a:bodyPr>
+                      <a:noAutofit/>
+                    </a:bodyPr>
+                    <a:lstStyle/>
+                    <a:p>
+                      <a:pPr lvl="0" rtl="0" algn="ctr">
+                        <a:spcBef>
+                          <a:spcPts val="0"/>
+                        </a:spcBef>
+                        <a:buNone/>
+                      </a:pPr>
+                      <a:r>
+                        <a:t/>
+                      </a:r>
+                      <a:endParaRPr>
+                        <a:latin typeface="Times New Roman"/>
+                        <a:ea typeface="Times New Roman"/>
+                        <a:cs typeface="Times New Roman"/>
+                        <a:sym typeface="Times New Roman"/>
+                      </a:endParaRPr>
+                    </a:p>
+                    <a:p>
+                      <a:pPr lvl="0" rtl="0" algn="ctr">
+                        <a:spcBef>
+                          <a:spcPts val="0"/>
+                        </a:spcBef>
+                        <a:buNone/>
+                      </a:pPr>
+                      <a:r>
+                        <a:t/>
+                      </a:r>
+                      <a:endParaRPr>
+                        <a:latin typeface="Times New Roman"/>
+                        <a:ea typeface="Times New Roman"/>
+                        <a:cs typeface="Times New Roman"/>
+                        <a:sym typeface="Times New Roman"/>
+                      </a:endParaRPr>
+                    </a:p>
+                    <a:p>
+                      <a:pPr lvl="0" rtl="0" algn="ctr">
+                        <a:spcBef>
+                          <a:spcPts val="0"/>
+                        </a:spcBef>
+                        <a:buNone/>
+                      </a:pPr>
+                      <a:r>
+                        <a:rPr lang="en-GB">
+                          <a:latin typeface="Times New Roman"/>
+                          <a:ea typeface="Times New Roman"/>
+                          <a:cs typeface="Times New Roman"/>
+                          <a:sym typeface="Times New Roman"/>
+                        </a:rPr>
+                        <a:t>Perceptron</a:t>
+                      </a:r>
+                    </a:p>
+                  </a:txBody>
+                  <a:tcPr marT="91425" marB="91425" marR="91425" marL="91425">
+                    <a:lnR cap="flat" cmpd="sng" w="19050">
+                      <a:solidFill>
+                        <a:srgbClr val="000000"/>
+                      </a:solidFill>
+                      <a:prstDash val="solid"/>
+                      <a:round/>
+                      <a:headEnd len="med" w="med" type="none"/>
+                      <a:tailEnd len="med" w="med" type="none"/>
+                    </a:lnR>
+                  </a:tcPr>
+                </a:tc>
+                <a:tc>
+                  <a:txBody>
+                    <a:bodyPr>
+                      <a:noAutofit/>
+                    </a:bodyPr>
+                    <a:lstStyle/>
+                    <a:p>
+                      <a:pPr lvl="0" algn="ctr">
+                        <a:spcBef>
+                          <a:spcPts val="0"/>
+                        </a:spcBef>
+                        <a:buNone/>
+                      </a:pPr>
+                      <a:r>
+                        <a:rPr lang="en-GB">
+                          <a:latin typeface="Times New Roman"/>
+                          <a:ea typeface="Times New Roman"/>
+                          <a:cs typeface="Times New Roman"/>
+                          <a:sym typeface="Times New Roman"/>
+                        </a:rPr>
+                        <a:t>AB</a:t>
+                      </a:r>
+                    </a:p>
+                  </a:txBody>
+                  <a:tcPr marT="91425" marB="91425" marR="91425" marL="91425">
+                    <a:lnL cap="flat" cmpd="sng" w="19050">
+                      <a:solidFill>
+                        <a:srgbClr val="000000"/>
+                      </a:solidFill>
+                      <a:prstDash val="solid"/>
+                      <a:round/>
+                      <a:headEnd len="med" w="med" type="none"/>
+                      <a:tailEnd len="med" w="med" type="none"/>
+                    </a:lnL>
+                    <a:lnR cap="flat" cmpd="sng" w="19050">
+                      <a:solidFill>
+                        <a:srgbClr val="000000"/>
+                      </a:solidFill>
+                      <a:prstDash val="solid"/>
+                      <a:round/>
+                      <a:headEnd len="med" w="med" type="none"/>
+                      <a:tailEnd len="med" w="med" type="none"/>
+                    </a:lnR>
+                    <a:lnT cap="flat" cmpd="sng" w="19050">
+                      <a:solidFill>
+                        <a:srgbClr val="000000"/>
+                      </a:solidFill>
+                      <a:prstDash val="solid"/>
+                      <a:round/>
+                      <a:headEnd len="med" w="med" type="none"/>
+                      <a:tailEnd len="med" w="med" type="none"/>
+                    </a:lnT>
+                    <a:lnB cap="flat" cmpd="sng" w="19050">
+                      <a:solidFill>
+                        <a:srgbClr val="000000"/>
+                      </a:solidFill>
+                      <a:prstDash val="solid"/>
+                      <a:round/>
+                      <a:headEnd len="med" w="med" type="none"/>
+                      <a:tailEnd len="med" w="med" type="none"/>
+                    </a:lnB>
+                  </a:tcPr>
+                </a:tc>
+                <a:tc>
+                  <a:txBody>
+                    <a:bodyPr>
+                      <a:noAutofit/>
+                    </a:bodyPr>
+                    <a:lstStyle/>
+                    <a:p>
+                      <a:pPr lvl="0" algn="ctr">
+                        <a:spcBef>
+                          <a:spcPts val="0"/>
+                        </a:spcBef>
+                        <a:buNone/>
+                      </a:pPr>
+                      <a:r>
+                        <a:rPr lang="en-GB">
+                          <a:latin typeface="Times New Roman"/>
+                          <a:ea typeface="Times New Roman"/>
+                          <a:cs typeface="Times New Roman"/>
+                          <a:sym typeface="Times New Roman"/>
+                        </a:rPr>
+                        <a:t>0.716</a:t>
+                      </a:r>
+                    </a:p>
+                  </a:txBody>
+                  <a:tcPr marT="91425" marB="91425" marR="91425" marL="91425">
+                    <a:lnL cap="flat" cmpd="sng" w="19050">
+                      <a:solidFill>
+                        <a:srgbClr val="000000"/>
+                      </a:solidFill>
+                      <a:prstDash val="solid"/>
+                      <a:round/>
+                      <a:headEnd len="med" w="med" type="none"/>
+                      <a:tailEnd len="med" w="med" type="none"/>
+                    </a:lnL>
+                    <a:lnR cap="flat" cmpd="sng" w="19050">
+                      <a:solidFill>
+                        <a:srgbClr val="000000"/>
+                      </a:solidFill>
+                      <a:prstDash val="solid"/>
+                      <a:round/>
+                      <a:headEnd len="med" w="med" type="none"/>
+                      <a:tailEnd len="med" w="med" type="none"/>
+                    </a:lnR>
+                    <a:lnT cap="flat" cmpd="sng" w="19050">
+                      <a:solidFill>
+                        <a:srgbClr val="000000"/>
+                      </a:solidFill>
+                      <a:prstDash val="solid"/>
+                      <a:round/>
+                      <a:headEnd len="med" w="med" type="none"/>
+                      <a:tailEnd len="med" w="med" type="none"/>
+                    </a:lnT>
+                    <a:lnB cap="flat" cmpd="sng" w="19050">
+                      <a:solidFill>
+                        <a:srgbClr val="000000"/>
+                      </a:solidFill>
+                      <a:prstDash val="solid"/>
+                      <a:round/>
+                      <a:headEnd len="med" w="med" type="none"/>
+                      <a:tailEnd len="med" w="med" type="none"/>
+                    </a:lnB>
+                  </a:tcPr>
+                </a:tc>
+                <a:tc>
+                  <a:txBody>
+                    <a:bodyPr>
+                      <a:noAutofit/>
+                    </a:bodyPr>
+                    <a:lstStyle/>
+                    <a:p>
+                      <a:pPr lvl="0" algn="ctr">
+                        <a:spcBef>
+                          <a:spcPts val="0"/>
+                        </a:spcBef>
+                        <a:buNone/>
+                      </a:pPr>
+                      <a:r>
+                        <a:rPr lang="en-GB">
+                          <a:latin typeface="Times New Roman"/>
+                          <a:ea typeface="Times New Roman"/>
+                          <a:cs typeface="Times New Roman"/>
+                          <a:sym typeface="Times New Roman"/>
+                        </a:rPr>
+                        <a:t>0.848</a:t>
+                      </a:r>
+                    </a:p>
+                  </a:txBody>
+                  <a:tcPr marT="91425" marB="91425" marR="91425" marL="91425">
+                    <a:lnL cap="flat" cmpd="sng" w="19050">
+                      <a:solidFill>
+                        <a:srgbClr val="000000"/>
+                      </a:solidFill>
+                      <a:prstDash val="solid"/>
+                      <a:round/>
+                      <a:headEnd len="med" w="med" type="none"/>
+                      <a:tailEnd len="med" w="med" type="none"/>
+                    </a:lnL>
+                    <a:lnR cap="flat" cmpd="sng" w="19050">
+                      <a:solidFill>
+                        <a:srgbClr val="000000"/>
+                      </a:solidFill>
+                      <a:prstDash val="solid"/>
+                      <a:round/>
+                      <a:headEnd len="med" w="med" type="none"/>
+                      <a:tailEnd len="med" w="med" type="none"/>
+                    </a:lnR>
+                    <a:lnT cap="flat" cmpd="sng" w="19050">
+                      <a:solidFill>
+                        <a:srgbClr val="000000"/>
+                      </a:solidFill>
+                      <a:prstDash val="solid"/>
+                      <a:round/>
+                      <a:headEnd len="med" w="med" type="none"/>
+                      <a:tailEnd len="med" w="med" type="none"/>
+                    </a:lnT>
+                    <a:lnB cap="flat" cmpd="sng" w="19050">
+                      <a:solidFill>
+                        <a:srgbClr val="000000"/>
+                      </a:solidFill>
+                      <a:prstDash val="solid"/>
+                      <a:round/>
+                      <a:headEnd len="med" w="med" type="none"/>
+                      <a:tailEnd len="med" w="med" type="none"/>
+                    </a:lnB>
+                  </a:tcPr>
+                </a:tc>
+                <a:tc>
+                  <a:txBody>
+                    <a:bodyPr>
+                      <a:noAutofit/>
+                    </a:bodyPr>
+                    <a:lstStyle/>
+                    <a:p>
+                      <a:pPr lvl="0" algn="ctr">
+                        <a:spcBef>
+                          <a:spcPts val="0"/>
+                        </a:spcBef>
+                        <a:buNone/>
+                      </a:pPr>
+                      <a:r>
+                        <a:rPr lang="en-GB">
+                          <a:latin typeface="Times New Roman"/>
+                          <a:ea typeface="Times New Roman"/>
+                          <a:cs typeface="Times New Roman"/>
+                          <a:sym typeface="Times New Roman"/>
+                        </a:rPr>
+                        <a:t>0.764</a:t>
+                      </a:r>
+                    </a:p>
+                  </a:txBody>
+                  <a:tcPr marT="91425" marB="91425" marR="91425" marL="91425">
+                    <a:lnL cap="flat" cmpd="sng" w="19050">
+                      <a:solidFill>
+                        <a:srgbClr val="000000"/>
+                      </a:solidFill>
+                      <a:prstDash val="solid"/>
+                      <a:round/>
+                      <a:headEnd len="med" w="med" type="none"/>
+                      <a:tailEnd len="med" w="med" type="none"/>
+                    </a:lnL>
+                    <a:lnR cap="flat" cmpd="sng" w="19050">
+                      <a:solidFill>
+                        <a:srgbClr val="000000"/>
+                      </a:solidFill>
+                      <a:prstDash val="solid"/>
+                      <a:round/>
+                      <a:headEnd len="med" w="med" type="none"/>
+                      <a:tailEnd len="med" w="med" type="none"/>
+                    </a:lnR>
+                    <a:lnT cap="flat" cmpd="sng" w="19050">
+                      <a:solidFill>
+                        <a:srgbClr val="000000"/>
+                      </a:solidFill>
+                      <a:prstDash val="solid"/>
+                      <a:round/>
+                      <a:headEnd len="med" w="med" type="none"/>
+                      <a:tailEnd len="med" w="med" type="none"/>
+                    </a:lnT>
+                    <a:lnB cap="flat" cmpd="sng" w="19050">
+                      <a:solidFill>
+                        <a:srgbClr val="000000"/>
+                      </a:solidFill>
+                      <a:prstDash val="solid"/>
+                      <a:round/>
+                      <a:headEnd len="med" w="med" type="none"/>
+                      <a:tailEnd len="med" w="med" type="none"/>
+                    </a:lnB>
+                  </a:tcPr>
+                </a:tc>
+              </a:tr>
+              <a:tr h="381000">
+                <a:tc vMerge="1"/>
+                <a:tc>
+                  <a:txBody>
+                    <a:bodyPr>
+                      <a:noAutofit/>
+                    </a:bodyPr>
+                    <a:lstStyle/>
+                    <a:p>
+                      <a:pPr lvl="0" algn="ctr">
+                        <a:spcBef>
+                          <a:spcPts val="0"/>
+                        </a:spcBef>
+                        <a:buNone/>
+                      </a:pPr>
+                      <a:r>
+                        <a:rPr lang="en-GB">
+                          <a:latin typeface="Times New Roman"/>
+                          <a:ea typeface="Times New Roman"/>
+                          <a:cs typeface="Times New Roman"/>
+                          <a:sym typeface="Times New Roman"/>
+                        </a:rPr>
+                        <a:t>A</a:t>
+                      </a:r>
+                    </a:p>
+                  </a:txBody>
+                  <a:tcPr marT="91425" marB="91425" marR="91425" marL="91425">
+                    <a:lnT cap="flat" cmpd="sng" w="19050">
+                      <a:solidFill>
+                        <a:srgbClr val="000000"/>
+                      </a:solidFill>
+                      <a:prstDash val="solid"/>
+                      <a:round/>
+                      <a:headEnd len="med" w="med" type="none"/>
+                      <a:tailEnd len="med" w="med" type="none"/>
+                    </a:lnT>
+                  </a:tcPr>
+                </a:tc>
+                <a:tc>
+                  <a:txBody>
+                    <a:bodyPr>
+                      <a:noAutofit/>
+                    </a:bodyPr>
+                    <a:lstStyle/>
+                    <a:p>
+                      <a:pPr lvl="0" algn="ctr">
+                        <a:spcBef>
+                          <a:spcPts val="0"/>
+                        </a:spcBef>
+                        <a:buNone/>
+                      </a:pPr>
+                      <a:r>
+                        <a:rPr lang="en-GB">
+                          <a:latin typeface="Times New Roman"/>
+                          <a:ea typeface="Times New Roman"/>
+                          <a:cs typeface="Times New Roman"/>
+                          <a:sym typeface="Times New Roman"/>
+                        </a:rPr>
+                        <a:t>0.752</a:t>
+                      </a:r>
+                    </a:p>
+                  </a:txBody>
+                  <a:tcPr marT="91425" marB="91425" marR="91425" marL="91425">
+                    <a:lnT cap="flat" cmpd="sng" w="19050">
+                      <a:solidFill>
+                        <a:srgbClr val="000000"/>
+                      </a:solidFill>
+                      <a:prstDash val="solid"/>
+                      <a:round/>
+                      <a:headEnd len="med" w="med" type="none"/>
+                      <a:tailEnd len="med" w="med" type="none"/>
+                    </a:lnT>
+                  </a:tcPr>
+                </a:tc>
+                <a:tc>
+                  <a:txBody>
+                    <a:bodyPr>
+                      <a:noAutofit/>
+                    </a:bodyPr>
+                    <a:lstStyle/>
+                    <a:p>
+                      <a:pPr lvl="0" algn="ctr">
+                        <a:spcBef>
+                          <a:spcPts val="0"/>
+                        </a:spcBef>
+                        <a:buNone/>
+                      </a:pPr>
+                      <a:r>
+                        <a:rPr lang="en-GB">
+                          <a:latin typeface="Times New Roman"/>
+                          <a:ea typeface="Times New Roman"/>
+                          <a:cs typeface="Times New Roman"/>
+                          <a:sym typeface="Times New Roman"/>
+                        </a:rPr>
+                        <a:t>0.868</a:t>
+                      </a:r>
+                    </a:p>
+                  </a:txBody>
+                  <a:tcPr marT="91425" marB="91425" marR="91425" marL="91425">
+                    <a:lnT cap="flat" cmpd="sng" w="19050">
+                      <a:solidFill>
+                        <a:srgbClr val="000000"/>
+                      </a:solidFill>
+                      <a:prstDash val="solid"/>
+                      <a:round/>
+                      <a:headEnd len="med" w="med" type="none"/>
+                      <a:tailEnd len="med" w="med" type="none"/>
+                    </a:lnT>
+                  </a:tcPr>
+                </a:tc>
+                <a:tc>
+                  <a:txBody>
+                    <a:bodyPr>
+                      <a:noAutofit/>
+                    </a:bodyPr>
+                    <a:lstStyle/>
+                    <a:p>
+                      <a:pPr lvl="0" algn="ctr">
+                        <a:spcBef>
+                          <a:spcPts val="0"/>
+                        </a:spcBef>
+                        <a:buNone/>
+                      </a:pPr>
+                      <a:r>
+                        <a:rPr lang="en-GB">
+                          <a:latin typeface="Times New Roman"/>
+                          <a:ea typeface="Times New Roman"/>
+                          <a:cs typeface="Times New Roman"/>
+                          <a:sym typeface="Times New Roman"/>
+                        </a:rPr>
+                        <a:t>0.795</a:t>
+                      </a:r>
+                    </a:p>
+                  </a:txBody>
+                  <a:tcPr marT="91425" marB="91425" marR="91425" marL="91425">
+                    <a:lnT cap="flat" cmpd="sng" w="19050">
+                      <a:solidFill>
+                        <a:srgbClr val="000000"/>
+                      </a:solidFill>
+                      <a:prstDash val="solid"/>
+                      <a:round/>
+                      <a:headEnd len="med" w="med" type="none"/>
+                      <a:tailEnd len="med" w="med" type="none"/>
+                    </a:lnT>
+                  </a:tcPr>
+                </a:tc>
+              </a:tr>
+              <a:tr h="381000">
+                <a:tc vMerge="1"/>
+                <a:tc>
+                  <a:txBody>
+                    <a:bodyPr>
+                      <a:noAutofit/>
+                    </a:bodyPr>
+                    <a:lstStyle/>
+                    <a:p>
+                      <a:pPr lvl="0" algn="ctr">
+                        <a:spcBef>
+                          <a:spcPts val="0"/>
+                        </a:spcBef>
+                        <a:buNone/>
+                      </a:pPr>
+                      <a:r>
+                        <a:rPr lang="en-GB">
+                          <a:latin typeface="Times New Roman"/>
+                          <a:ea typeface="Times New Roman"/>
+                          <a:cs typeface="Times New Roman"/>
+                          <a:sym typeface="Times New Roman"/>
+                        </a:rPr>
+                        <a:t>-</a:t>
+                      </a:r>
+                    </a:p>
+                  </a:txBody>
+                  <a:tcPr marT="91425" marB="91425" marR="91425" marL="91425"/>
+                </a:tc>
+                <a:tc>
+                  <a:txBody>
+                    <a:bodyPr>
+                      <a:noAutofit/>
+                    </a:bodyPr>
+                    <a:lstStyle/>
+                    <a:p>
+                      <a:pPr lvl="0" algn="ctr">
+                        <a:spcBef>
+                          <a:spcPts val="0"/>
+                        </a:spcBef>
+                        <a:buNone/>
+                      </a:pPr>
+                      <a:r>
+                        <a:rPr lang="en-GB">
+                          <a:latin typeface="Times New Roman"/>
+                          <a:ea typeface="Times New Roman"/>
+                          <a:cs typeface="Times New Roman"/>
+                          <a:sym typeface="Times New Roman"/>
+                        </a:rPr>
+                        <a:t>0.678</a:t>
+                      </a:r>
+                    </a:p>
+                  </a:txBody>
+                  <a:tcPr marT="91425" marB="91425" marR="91425" marL="91425"/>
+                </a:tc>
+                <a:tc>
+                  <a:txBody>
+                    <a:bodyPr>
+                      <a:noAutofit/>
+                    </a:bodyPr>
+                    <a:lstStyle/>
+                    <a:p>
+                      <a:pPr lvl="0" algn="ctr">
+                        <a:spcBef>
+                          <a:spcPts val="0"/>
+                        </a:spcBef>
+                        <a:buNone/>
+                      </a:pPr>
+                      <a:r>
+                        <a:rPr lang="en-GB">
+                          <a:latin typeface="Times New Roman"/>
+                          <a:ea typeface="Times New Roman"/>
+                          <a:cs typeface="Times New Roman"/>
+                          <a:sym typeface="Times New Roman"/>
+                        </a:rPr>
+                        <a:t>0.895</a:t>
+                      </a:r>
+                    </a:p>
+                  </a:txBody>
+                  <a:tcPr marT="91425" marB="91425" marR="91425" marL="91425"/>
+                </a:tc>
+                <a:tc>
+                  <a:txBody>
+                    <a:bodyPr>
+                      <a:noAutofit/>
+                    </a:bodyPr>
+                    <a:lstStyle/>
+                    <a:p>
+                      <a:pPr lvl="0" algn="ctr">
+                        <a:spcBef>
+                          <a:spcPts val="0"/>
+                        </a:spcBef>
+                        <a:buNone/>
+                      </a:pPr>
+                      <a:r>
+                        <a:rPr lang="en-GB">
+                          <a:latin typeface="Times New Roman"/>
+                          <a:ea typeface="Times New Roman"/>
+                          <a:cs typeface="Times New Roman"/>
+                          <a:sym typeface="Times New Roman"/>
+                        </a:rPr>
+                        <a:t>0.746</a:t>
+                      </a:r>
+                    </a:p>
+                  </a:txBody>
+                  <a:tcPr marT="91425" marB="91425" marR="91425" marL="91425">
+                    <a:solidFill>
+                      <a:srgbClr val="FF9900"/>
+                    </a:solidFill>
+                  </a:tcPr>
+                </a:tc>
+              </a:tr>
+            </a:tbl>
+          </a:graphicData>
+        </a:graphic>
+      </p:graphicFrame>
+    </p:spTree>
+  </p:cSld>
+  <p:clrMapOvr>
+    <a:masterClrMapping/>
+  </p:clrMapOvr>
+  <p:transition spd="slow">
+    <p:cut/>
+  </p:transition>
+</p:sld>
+</file>
+
 <file path=ppt/theme/theme1.xml><?xml version="1.0" encoding="utf-8"?>
+<a:theme xmlns:a="http://schemas.openxmlformats.org/drawingml/2006/main" xmlns:r="http://schemas.openxmlformats.org/officeDocument/2006/relationships" name="tropic">
+  <a:themeElements>
+    <a:clrScheme name="Tropic">
+      <a:dk1>
+        <a:srgbClr val="A1E8D9"/>
+      </a:dk1>
+      <a:lt1>
+        <a:srgbClr val="FFFFFF"/>
+      </a:lt1>
+      <a:dk2>
+        <a:srgbClr val="695D46"/>
+      </a:dk2>
+      <a:lt2>
+        <a:srgbClr val="B3A77D"/>
+      </a:lt2>
+      <a:accent1>
+        <a:srgbClr val="EF6C00"/>
+      </a:accent1>
+      <a:accent2>
+        <a:srgbClr val="009668"/>
+      </a:accent2>
+      <a:accent3>
+        <a:srgbClr val="4DB6AC"/>
+      </a:accent3>
+      <a:accent4>
+        <a:srgbClr val="FF9800"/>
+      </a:accent4>
+      <a:accent5>
+        <a:srgbClr val="CE93D8"/>
+      </a:accent5>
+      <a:accent6>
+        <a:srgbClr val="EEFF41"/>
+      </a:accent6>
+      <a:hlink>
+        <a:srgbClr val="CE93D8"/>
+      </a:hlink>
+      <a:folHlink>
+        <a:srgbClr val="CE93D8"/>
+      </a:folHlink>
+    </a:clrScheme>
+    <a:fontScheme name="Office">
+      <a:majorFont>
+        <a:latin typeface="Arial"/>
+        <a:ea typeface=""/>
+        <a:cs typeface=""/>
+        <a:font script="Jpan" typeface="ＭＳ Ｐゴシック"/>
+        <a:font script="Hang" typeface="맑은 고딕"/>
+        <a:font script="Hans" typeface="宋体"/>
+        <a:font script="Hant" typeface="新細明體"/>
+        <a:font script="Arab" typeface="Times New Roman"/>
+        <a:font script="Hebr" typeface="Times New Roman"/>
+        <a:font script="Thai" typeface="Angsana New"/>
+        <a:font script="Ethi" typeface="Nyala"/>
+        <a:font script="Beng" typeface="Vrinda"/>
+        <a:font script="Gujr" typeface="Shruti"/>
+        <a:font script="Khmr" typeface="MoolBoran"/>
+        <a:font script="Knda" typeface="Tunga"/>
+        <a:font script="Guru" typeface="Raavi"/>
+        <a:font script="Cans" typeface="Euphemia"/>
+        <a:font script="Cher" typeface="Plantagenet Cherokee"/>
+        <a:font script="Yiii" typeface="Microsoft Yi Baiti"/>
+        <a:font script="Tibt" typeface="Microsoft Himalaya"/>
+        <a:font script="Thaa" typeface="MV Boli"/>
+        <a:font script="Deva" typeface="Mangal"/>
+        <a:font script="Telu" typeface="Gautami"/>
+        <a:font script="Taml" typeface="Latha"/>
+        <a:font script="Syrc" typeface="Estrangelo Edessa"/>
+        <a:font script="Orya" typeface="Kalinga"/>
+        <a:font script="Mlym" typeface="Kartika"/>
+        <a:font script="Laoo" typeface="DokChampa"/>
+        <a:font script="Sinh" typeface="Iskoola Pota"/>
+        <a:font script="Mong" typeface="Mongolian Baiti"/>
+        <a:font script="Viet" typeface="Times New Roman"/>
+        <a:font script="Uigh" typeface="Microsoft Uighur"/>
+        <a:font script="Geor" typeface="Sylfaen"/>
+      </a:majorFont>
+      <a:minorFont>
+        <a:latin typeface="Arial"/>
+        <a:ea typeface=""/>
+        <a:cs typeface=""/>
+        <a:font script="Jpan" typeface="ＭＳ Ｐゴシック"/>
+        <a:font script="Hang" typeface="맑은 고딕"/>
+        <a:font script="Hans" typeface="宋体"/>
+        <a:font script="Hant" typeface="新細明體"/>
+        <a:font script="Arab" typeface="Arial"/>
+        <a:font script="Hebr" typeface="Arial"/>
+        <a:font script="Thai" typeface="Cordia New"/>
+        <a:font script="Ethi" typeface="Nyala"/>
+        <a:font script="Beng" typeface="Vrinda"/>
+        <a:font script="Gujr" typeface="Shruti"/>
+        <a:font script="Khmr" typeface="DaunPenh"/>
+        <a:font script="Knda" typeface="Tunga"/>
+        <a:font script="Guru" typeface="Raavi"/>
+        <a:font script="Cans" typeface="Euphemia"/>
+        <a:font script="Cher" typeface="Plantagenet Cherokee"/>
+        <a:font script="Yiii" typeface="Microsoft Yi Baiti"/>
+        <a:font script="Tibt" typeface="Microsoft Himalaya"/>
+        <a:font script="Thaa" typeface="MV Boli"/>
+        <a:font script="Deva" typeface="Mangal"/>
+        <a:font script="Telu" typeface="Gautami"/>
+        <a:font script="Taml" typeface="Latha"/>
+        <a:font script="Syrc" typeface="Estrangelo Edessa"/>
+        <a:font script="Orya" typeface="Kalinga"/>
+        <a:font script="Mlym" typeface="Kartika"/>
+        <a:font script="Laoo" typeface="DokChampa"/>
+        <a:font script="Sinh" typeface="Iskoola Pota"/>
+        <a:font script="Mong" typeface="Mongolian Baiti"/>
+        <a:font script="Viet" typeface="Arial"/>
+        <a:font script="Uigh" typeface="Microsoft Uighur"/>
+        <a:font script="Geor" typeface="Sylfaen"/>
+      </a:minorFont>
+    </a:fontScheme>
+    <a:fmtScheme name="Office">
+      <a:fillStyleLst>
+        <a:solidFill>
+          <a:schemeClr val="phClr"/>
+        </a:solidFill>
+        <a:gradFill rotWithShape="1">
+          <a:gsLst>
+            <a:gs pos="0">
+              <a:schemeClr val="phClr">
+                <a:tint val="50000"/>
+                <a:satMod val="300000"/>
+              </a:schemeClr>
+            </a:gs>
+            <a:gs pos="35000">
+              <a:schemeClr val="phClr">
+                <a:tint val="37000"/>
+                <a:satMod val="300000"/>
+              </a:schemeClr>
+            </a:gs>
+            <a:gs pos="100000">
+              <a:schemeClr val="phClr">
+                <a:tint val="15000"/>
+                <a:satMod val="350000"/>
+              </a:schemeClr>
+            </a:gs>
+          </a:gsLst>
+          <a:lin ang="16200000" scaled="1"/>
+        </a:gradFill>
+        <a:gradFill rotWithShape="1">
+          <a:gsLst>
+            <a:gs pos="0">
+              <a:schemeClr val="phClr">
+                <a:tint val="100000"/>
+                <a:shade val="100000"/>
+                <a:satMod val="130000"/>
+              </a:schemeClr>
+            </a:gs>
+            <a:gs pos="100000">
+              <a:schemeClr val="phClr">
+                <a:tint val="50000"/>
+                <a:shade val="100000"/>
+                <a:satMod val="350000"/>
+              </a:schemeClr>
+            </a:gs>
+          </a:gsLst>
+          <a:lin ang="16200000" scaled="0"/>
+        </a:gradFill>
+      </a:fillStyleLst>
+      <a:lnStyleLst>
+        <a:ln w="9525" cap="flat" cmpd="sng" algn="ctr">
+          <a:solidFill>
+            <a:schemeClr val="phClr">
+              <a:shade val="95000"/>
+              <a:satMod val="105000"/>
+            </a:schemeClr>
+          </a:solidFill>
+          <a:prstDash val="solid"/>
+        </a:ln>
+        <a:ln w="25400" cap="flat" cmpd="sng" algn="ctr">
+          <a:solidFill>
+            <a:schemeClr val="phClr"/>
+          </a:solidFill>
+          <a:prstDash val="solid"/>
+        </a:ln>
+        <a:ln w="38100" cap="flat" cmpd="sng" algn="ctr">
+          <a:solidFill>
+            <a:schemeClr val="phClr"/>
+          </a:solidFill>
+          <a:prstDash val="solid"/>
+        </a:ln>
+      </a:lnStyleLst>
+      <a:effectStyleLst>
+        <a:effectStyle>
+          <a:effectLst>
+            <a:outerShdw blurRad="40000" dist="20000" dir="5400000" rotWithShape="0">
+              <a:srgbClr val="000000">
+                <a:alpha val="38000"/>
+              </a:srgbClr>
+            </a:outerShdw>
+          </a:effectLst>
+        </a:effectStyle>
+        <a:effectStyle>
+          <a:effectLst>
+            <a:outerShdw blurRad="40000" dist="23000" dir="5400000" rotWithShape="0">
+              <a:srgbClr val="000000">
+                <a:alpha val="35000"/>
+              </a:srgbClr>
+            </a:outerShdw>
+          </a:effectLst>
+        </a:effectStyle>
+        <a:effectStyle>
+          <a:effectLst>
+            <a:outerShdw blurRad="40000" dist="23000" dir="5400000" rotWithShape="0">
+              <a:srgbClr val="000000">
+                <a:alpha val="35000"/>
+              </a:srgbClr>
+            </a:outerShdw>
+          </a:effectLst>
+          <a:scene3d>
+            <a:camera prst="orthographicFront">
+              <a:rot lat="0" lon="0" rev="0"/>
+            </a:camera>
+            <a:lightRig rig="threePt" dir="t">
+              <a:rot lat="0" lon="0" rev="1200000"/>
+            </a:lightRig>
+          </a:scene3d>
+          <a:sp3d>
+            <a:bevelT w="63500" h="25400"/>
+          </a:sp3d>
+        </a:effectStyle>
+      </a:effectStyleLst>
+      <a:bgFillStyleLst>
+        <a:solidFill>
+          <a:schemeClr val="phClr"/>
+        </a:solidFill>
+        <a:gradFill rotWithShape="1">
+          <a:gsLst>
+            <a:gs pos="0">
+              <a:schemeClr val="phClr">
+                <a:tint val="40000"/>
+                <a:satMod val="350000"/>
+              </a:schemeClr>
+            </a:gs>
+            <a:gs pos="40000">
+              <a:schemeClr val="phClr">
+                <a:tint val="45000"/>
+                <a:shade val="99000"/>
+                <a:satMod val="350000"/>
+              </a:schemeClr>
+            </a:gs>
+            <a:gs pos="100000">
+              <a:schemeClr val="phClr">
+                <a:shade val="20000"/>
+                <a:satMod val="255000"/>
+              </a:schemeClr>
+            </a:gs>
+          </a:gsLst>
+          <a:path path="circle">
+            <a:fillToRect l="50000" t="-80000" r="50000" b="180000"/>
+          </a:path>
+        </a:gradFill>
+        <a:gradFill rotWithShape="1">
+          <a:gsLst>
+            <a:gs pos="0">
+              <a:schemeClr val="phClr">
+                <a:tint val="80000"/>
+                <a:satMod val="300000"/>
+              </a:schemeClr>
+            </a:gs>
+            <a:gs pos="100000">
+              <a:schemeClr val="phClr">
+                <a:shade val="30000"/>
+                <a:satMod val="200000"/>
+              </a:schemeClr>
+            </a:gs>
+          </a:gsLst>
+          <a:path path="circle">
+            <a:fillToRect l="50000" t="50000" r="50000" b="50000"/>
+          </a:path>
+        </a:gradFill>
+      </a:bgFillStyleLst>
+    </a:fmtScheme>
+  </a:themeElements>
+</a:theme>
+</file>
+
+<file path=ppt/theme/theme2.xml><?xml version="1.0" encoding="utf-8"?>
 <a:theme xmlns:a="http://schemas.openxmlformats.org/drawingml/2006/main" xmlns:r="http://schemas.openxmlformats.org/officeDocument/2006/relationships" name="Custom Theme">
   <a:themeElements>
     <a:clrScheme name="Default">
@@ -8028,283 +10640,4 @@
     </a:fmtScheme>
   </a:themeElements>
 </a:theme>
-</file>
-
-<file path=ppt/theme/theme2.xml><?xml version="1.0" encoding="utf-8"?>
-<a:theme xmlns:a="http://schemas.openxmlformats.org/drawingml/2006/main" xmlns:r="http://schemas.openxmlformats.org/officeDocument/2006/relationships" name="tropic">
-  <a:themeElements>
-    <a:clrScheme name="Tropic">
-      <a:dk1>
-        <a:srgbClr val="A1E8D9"/>
-      </a:dk1>
-      <a:lt1>
-        <a:srgbClr val="FFFFFF"/>
-      </a:lt1>
-      <a:dk2>
-        <a:srgbClr val="695D46"/>
-      </a:dk2>
-      <a:lt2>
-        <a:srgbClr val="B3A77D"/>
-      </a:lt2>
-      <a:accent1>
-        <a:srgbClr val="EF6C00"/>
-      </a:accent1>
-      <a:accent2>
-        <a:srgbClr val="009668"/>
-      </a:accent2>
-      <a:accent3>
-        <a:srgbClr val="4DB6AC"/>
-      </a:accent3>
-      <a:accent4>
-        <a:srgbClr val="FF9800"/>
-      </a:accent4>
-      <a:accent5>
-        <a:srgbClr val="CE93D8"/>
-      </a:accent5>
-      <a:accent6>
-        <a:srgbClr val="EEFF41"/>
-      </a:accent6>
-      <a:hlink>
-        <a:srgbClr val="CE93D8"/>
-      </a:hlink>
-      <a:folHlink>
-        <a:srgbClr val="CE93D8"/>
-      </a:folHlink>
-    </a:clrScheme>
-    <a:fontScheme name="Office">
-      <a:majorFont>
-        <a:latin typeface="Arial"/>
-        <a:ea typeface=""/>
-        <a:cs typeface=""/>
-        <a:font script="Jpan" typeface="ＭＳ Ｐゴシック"/>
-        <a:font script="Hang" typeface="맑은 고딕"/>
-        <a:font script="Hans" typeface="宋体"/>
-        <a:font script="Hant" typeface="新細明體"/>
-        <a:font script="Arab" typeface="Times New Roman"/>
-        <a:font script="Hebr" typeface="Times New Roman"/>
-        <a:font script="Thai" typeface="Angsana New"/>
-        <a:font script="Ethi" typeface="Nyala"/>
-        <a:font script="Beng" typeface="Vrinda"/>
-        <a:font script="Gujr" typeface="Shruti"/>
-        <a:font script="Khmr" typeface="MoolBoran"/>
-        <a:font script="Knda" typeface="Tunga"/>
-        <a:font script="Guru" typeface="Raavi"/>
-        <a:font script="Cans" typeface="Euphemia"/>
-        <a:font script="Cher" typeface="Plantagenet Cherokee"/>
-        <a:font script="Yiii" typeface="Microsoft Yi Baiti"/>
-        <a:font script="Tibt" typeface="Microsoft Himalaya"/>
-        <a:font script="Thaa" typeface="MV Boli"/>
-        <a:font script="Deva" typeface="Mangal"/>
-        <a:font script="Telu" typeface="Gautami"/>
-        <a:font script="Taml" typeface="Latha"/>
-        <a:font script="Syrc" typeface="Estrangelo Edessa"/>
-        <a:font script="Orya" typeface="Kalinga"/>
-        <a:font script="Mlym" typeface="Kartika"/>
-        <a:font script="Laoo" typeface="DokChampa"/>
-        <a:font script="Sinh" typeface="Iskoola Pota"/>
-        <a:font script="Mong" typeface="Mongolian Baiti"/>
-        <a:font script="Viet" typeface="Times New Roman"/>
-        <a:font script="Uigh" typeface="Microsoft Uighur"/>
-        <a:font script="Geor" typeface="Sylfaen"/>
-      </a:majorFont>
-      <a:minorFont>
-        <a:latin typeface="Arial"/>
-        <a:ea typeface=""/>
-        <a:cs typeface=""/>
-        <a:font script="Jpan" typeface="ＭＳ Ｐゴシック"/>
-        <a:font script="Hang" typeface="맑은 고딕"/>
-        <a:font script="Hans" typeface="宋体"/>
-        <a:font script="Hant" typeface="新細明體"/>
-        <a:font script="Arab" typeface="Arial"/>
-        <a:font script="Hebr" typeface="Arial"/>
-        <a:font script="Thai" typeface="Cordia New"/>
-        <a:font script="Ethi" typeface="Nyala"/>
-        <a:font script="Beng" typeface="Vrinda"/>
-        <a:font script="Gujr" typeface="Shruti"/>
-        <a:font script="Khmr" typeface="DaunPenh"/>
-        <a:font script="Knda" typeface="Tunga"/>
-        <a:font script="Guru" typeface="Raavi"/>
-        <a:font script="Cans" typeface="Euphemia"/>
-        <a:font script="Cher" typeface="Plantagenet Cherokee"/>
-        <a:font script="Yiii" typeface="Microsoft Yi Baiti"/>
-        <a:font script="Tibt" typeface="Microsoft Himalaya"/>
-        <a:font script="Thaa" typeface="MV Boli"/>
-        <a:font script="Deva" typeface="Mangal"/>
-        <a:font script="Telu" typeface="Gautami"/>
-        <a:font script="Taml" typeface="Latha"/>
-        <a:font script="Syrc" typeface="Estrangelo Edessa"/>
-        <a:font script="Orya" typeface="Kalinga"/>
-        <a:font script="Mlym" typeface="Kartika"/>
-        <a:font script="Laoo" typeface="DokChampa"/>
-        <a:font script="Sinh" typeface="Iskoola Pota"/>
-        <a:font script="Mong" typeface="Mongolian Baiti"/>
-        <a:font script="Viet" typeface="Arial"/>
-        <a:font script="Uigh" typeface="Microsoft Uighur"/>
-        <a:font script="Geor" typeface="Sylfaen"/>
-      </a:minorFont>
-    </a:fontScheme>
-    <a:fmtScheme name="Office">
-      <a:fillStyleLst>
-        <a:solidFill>
-          <a:schemeClr val="phClr"/>
-        </a:solidFill>
-        <a:gradFill rotWithShape="1">
-          <a:gsLst>
-            <a:gs pos="0">
-              <a:schemeClr val="phClr">
-                <a:tint val="50000"/>
-                <a:satMod val="300000"/>
-              </a:schemeClr>
-            </a:gs>
-            <a:gs pos="35000">
-              <a:schemeClr val="phClr">
-                <a:tint val="37000"/>
-                <a:satMod val="300000"/>
-              </a:schemeClr>
-            </a:gs>
-            <a:gs pos="100000">
-              <a:schemeClr val="phClr">
-                <a:tint val="15000"/>
-                <a:satMod val="350000"/>
-              </a:schemeClr>
-            </a:gs>
-          </a:gsLst>
-          <a:lin ang="16200000" scaled="1"/>
-        </a:gradFill>
-        <a:gradFill rotWithShape="1">
-          <a:gsLst>
-            <a:gs pos="0">
-              <a:schemeClr val="phClr">
-                <a:tint val="100000"/>
-                <a:shade val="100000"/>
-                <a:satMod val="130000"/>
-              </a:schemeClr>
-            </a:gs>
-            <a:gs pos="100000">
-              <a:schemeClr val="phClr">
-                <a:tint val="50000"/>
-                <a:shade val="100000"/>
-                <a:satMod val="350000"/>
-              </a:schemeClr>
-            </a:gs>
-          </a:gsLst>
-          <a:lin ang="16200000" scaled="0"/>
-        </a:gradFill>
-      </a:fillStyleLst>
-      <a:lnStyleLst>
-        <a:ln w="9525" cap="flat" cmpd="sng" algn="ctr">
-          <a:solidFill>
-            <a:schemeClr val="phClr">
-              <a:shade val="95000"/>
-              <a:satMod val="105000"/>
-            </a:schemeClr>
-          </a:solidFill>
-          <a:prstDash val="solid"/>
-        </a:ln>
-        <a:ln w="25400" cap="flat" cmpd="sng" algn="ctr">
-          <a:solidFill>
-            <a:schemeClr val="phClr"/>
-          </a:solidFill>
-          <a:prstDash val="solid"/>
-        </a:ln>
-        <a:ln w="38100" cap="flat" cmpd="sng" algn="ctr">
-          <a:solidFill>
-            <a:schemeClr val="phClr"/>
-          </a:solidFill>
-          <a:prstDash val="solid"/>
-        </a:ln>
-      </a:lnStyleLst>
-      <a:effectStyleLst>
-        <a:effectStyle>
-          <a:effectLst>
-            <a:outerShdw blurRad="40000" dist="20000" dir="5400000" rotWithShape="0">
-              <a:srgbClr val="000000">
-                <a:alpha val="38000"/>
-              </a:srgbClr>
-            </a:outerShdw>
-          </a:effectLst>
-        </a:effectStyle>
-        <a:effectStyle>
-          <a:effectLst>
-            <a:outerShdw blurRad="40000" dist="23000" dir="5400000" rotWithShape="0">
-              <a:srgbClr val="000000">
-                <a:alpha val="35000"/>
-              </a:srgbClr>
-            </a:outerShdw>
-          </a:effectLst>
-        </a:effectStyle>
-        <a:effectStyle>
-          <a:effectLst>
-            <a:outerShdw blurRad="40000" dist="23000" dir="5400000" rotWithShape="0">
-              <a:srgbClr val="000000">
-                <a:alpha val="35000"/>
-              </a:srgbClr>
-            </a:outerShdw>
-          </a:effectLst>
-          <a:scene3d>
-            <a:camera prst="orthographicFront">
-              <a:rot lat="0" lon="0" rev="0"/>
-            </a:camera>
-            <a:lightRig rig="threePt" dir="t">
-              <a:rot lat="0" lon="0" rev="1200000"/>
-            </a:lightRig>
-          </a:scene3d>
-          <a:sp3d>
-            <a:bevelT w="63500" h="25400"/>
-          </a:sp3d>
-        </a:effectStyle>
-      </a:effectStyleLst>
-      <a:bgFillStyleLst>
-        <a:solidFill>
-          <a:schemeClr val="phClr"/>
-        </a:solidFill>
-        <a:gradFill rotWithShape="1">
-          <a:gsLst>
-            <a:gs pos="0">
-              <a:schemeClr val="phClr">
-                <a:tint val="40000"/>
-                <a:satMod val="350000"/>
-              </a:schemeClr>
-            </a:gs>
-            <a:gs pos="40000">
-              <a:schemeClr val="phClr">
-                <a:tint val="45000"/>
-                <a:shade val="99000"/>
-                <a:satMod val="350000"/>
-              </a:schemeClr>
-            </a:gs>
-            <a:gs pos="100000">
-              <a:schemeClr val="phClr">
-                <a:shade val="20000"/>
-                <a:satMod val="255000"/>
-              </a:schemeClr>
-            </a:gs>
-          </a:gsLst>
-          <a:path path="circle">
-            <a:fillToRect l="50000" t="-80000" r="50000" b="180000"/>
-          </a:path>
-        </a:gradFill>
-        <a:gradFill rotWithShape="1">
-          <a:gsLst>
-            <a:gs pos="0">
-              <a:schemeClr val="phClr">
-                <a:tint val="80000"/>
-                <a:satMod val="300000"/>
-              </a:schemeClr>
-            </a:gs>
-            <a:gs pos="100000">
-              <a:schemeClr val="phClr">
-                <a:shade val="30000"/>
-                <a:satMod val="200000"/>
-              </a:schemeClr>
-            </a:gs>
-          </a:gsLst>
-          <a:path path="circle">
-            <a:fillToRect l="50000" t="50000" r="50000" b="50000"/>
-          </a:path>
-        </a:gradFill>
-      </a:bgFillStyleLst>
-    </a:fmtScheme>
-  </a:themeElements>
-</a:theme>
 </file>
</xml_diff>